<commit_message>
switched slides 6 and 7
</commit_message>
<xml_diff>
--- a/slides/Final_usecase_presentation_vipulballupet_20122022.pptx
+++ b/slides/Final_usecase_presentation_vipulballupet_20122022.pptx
@@ -13,8 +13,8 @@
     <p:sldId id="258" r:id="rId4"/>
     <p:sldId id="260" r:id="rId5"/>
     <p:sldId id="259" r:id="rId6"/>
-    <p:sldId id="268" r:id="rId7"/>
-    <p:sldId id="262" r:id="rId8"/>
+    <p:sldId id="262" r:id="rId7"/>
+    <p:sldId id="268" r:id="rId8"/>
     <p:sldId id="263" r:id="rId9"/>
     <p:sldId id="266" r:id="rId10"/>
     <p:sldId id="264" r:id="rId11"/>
@@ -121,7 +121,7 @@
   </p:defaultTextStyle>
   <p:extLst>
     <p:ext uri="{EFAFB233-063F-42B5-8137-9DF3F51BA10A}">
-      <p15:sldGuideLst xmlns:p15="http://schemas.microsoft.com/office/powerpoint/2012/main"/>
+      <p15:sldGuideLst xmlns="" xmlns:p15="http://schemas.microsoft.com/office/powerpoint/2012/main"/>
     </p:ext>
   </p:extLst>
 </p:presentation>
@@ -2270,25 +2270,25 @@
     </dgm:pt>
   </dgm:ptLst>
   <dgm:cxnLst>
+    <dgm:cxn modelId="{3788F7BD-F650-4EEE-988B-C5159D862A03}" srcId="{2D9B8248-A84C-4BF9-B876-47DB58F1B1CB}" destId="{2526652F-26EE-453A-BEC4-F01BD65CA972}" srcOrd="0" destOrd="0" parTransId="{AC7DE637-B452-4DBD-BB6E-2804A1EE89D7}" sibTransId="{D5DD4875-7775-48BD-A0A3-858CD1EBAF08}"/>
+    <dgm:cxn modelId="{FE7B753B-64EB-4277-8C24-7A002E5AD524}" type="presOf" srcId="{E02407B2-69BD-4223-9434-57C57DCDDD27}" destId="{C424357E-0E64-446A-BAD8-A1DC0D6478E3}" srcOrd="0" destOrd="0" presId="urn:microsoft.com/office/officeart/2005/8/layout/chevron2"/>
+    <dgm:cxn modelId="{C2DDF3D4-D993-40F0-ADD4-E0173D555195}" srcId="{2D9B8248-A84C-4BF9-B876-47DB58F1B1CB}" destId="{B58640A5-27C8-49EB-9BE4-C9356A3120B6}" srcOrd="1" destOrd="0" parTransId="{E69E5FDA-7DA2-4E09-B658-7BC2F00682E2}" sibTransId="{7F8DE8D2-8039-413E-9092-F0B9FEE74EDB}"/>
+    <dgm:cxn modelId="{B84BE288-362A-4FA1-831E-9F1D3C16D4B8}" srcId="{2D9B8248-A84C-4BF9-B876-47DB58F1B1CB}" destId="{F90FB44B-1E7D-4E17-837E-6047757F50F3}" srcOrd="2" destOrd="0" parTransId="{B9C3D8BE-A775-473C-AFCC-DAD5B5938503}" sibTransId="{2C9A325E-B040-4298-BEBC-8A5408140973}"/>
+    <dgm:cxn modelId="{168D3F37-7B12-41E4-85C5-9F9579352DD8}" srcId="{E02407B2-69BD-4223-9434-57C57DCDDD27}" destId="{2D9B8248-A84C-4BF9-B876-47DB58F1B1CB}" srcOrd="0" destOrd="0" parTransId="{25049E3C-DA08-4E0D-9BA4-017037386E94}" sibTransId="{91129CC3-2241-4F11-8DC8-EEE2B2925724}"/>
+    <dgm:cxn modelId="{0122400C-555E-431A-A452-6E325B2599C9}" type="presOf" srcId="{9844DEEE-5F53-4632-B3A9-4CC25F9FA117}" destId="{3F06902A-853F-46C4-AEE2-C54788C5705F}" srcOrd="0" destOrd="2" presId="urn:microsoft.com/office/officeart/2005/8/layout/chevron2"/>
+    <dgm:cxn modelId="{0356DF4E-C4D8-4424-8E4D-F9DBF358A002}" type="presOf" srcId="{37653A34-476C-4926-95FC-355BC7ED913D}" destId="{3F06902A-853F-46C4-AEE2-C54788C5705F}" srcOrd="0" destOrd="0" presId="urn:microsoft.com/office/officeart/2005/8/layout/chevron2"/>
+    <dgm:cxn modelId="{DBAD2216-45A6-496F-AA44-4223043B556B}" type="presOf" srcId="{E2F44286-75C6-4060-BB75-B86E41F8651F}" destId="{5CAEECB3-3614-4778-BD06-2EAB2B0729D6}" srcOrd="0" destOrd="0" presId="urn:microsoft.com/office/officeart/2005/8/layout/chevron2"/>
+    <dgm:cxn modelId="{178B870F-A16A-453B-9F1B-6FB47A81E247}" type="presOf" srcId="{2D9B8248-A84C-4BF9-B876-47DB58F1B1CB}" destId="{E4C4D1A6-2096-486C-9408-60CFA4C9EF76}" srcOrd="0" destOrd="0" presId="urn:microsoft.com/office/officeart/2005/8/layout/chevron2"/>
+    <dgm:cxn modelId="{F38E5CE9-B087-4C4D-B66F-3212C4558D77}" type="presOf" srcId="{31C6116D-5871-4A7A-B7F0-49664C582129}" destId="{D2F26B8E-6196-4DAD-AD69-9B5C6FFFFF7C}" srcOrd="0" destOrd="3" presId="urn:microsoft.com/office/officeart/2005/8/layout/chevron2"/>
+    <dgm:cxn modelId="{8139D715-8BAE-4137-89EB-86AB507ACE07}" srcId="{E02407B2-69BD-4223-9434-57C57DCDDD27}" destId="{E2F44286-75C6-4060-BB75-B86E41F8651F}" srcOrd="1" destOrd="0" parTransId="{37E68243-BF78-45C2-847B-B53BDB03EDF2}" sibTransId="{E92B269C-029C-4A84-9662-8A340EFF3DCA}"/>
+    <dgm:cxn modelId="{DC381711-BE6C-4324-8788-17F6044CA4A7}" type="presOf" srcId="{2526652F-26EE-453A-BEC4-F01BD65CA972}" destId="{D2F26B8E-6196-4DAD-AD69-9B5C6FFFFF7C}" srcOrd="0" destOrd="0" presId="urn:microsoft.com/office/officeart/2005/8/layout/chevron2"/>
+    <dgm:cxn modelId="{0910956B-3F9C-4F31-972C-AC83A4C97581}" type="presOf" srcId="{F90FB44B-1E7D-4E17-837E-6047757F50F3}" destId="{D2F26B8E-6196-4DAD-AD69-9B5C6FFFFF7C}" srcOrd="0" destOrd="2" presId="urn:microsoft.com/office/officeart/2005/8/layout/chevron2"/>
+    <dgm:cxn modelId="{F8C7A0E1-1C5F-40E1-8737-405AE7993383}" srcId="{2D9B8248-A84C-4BF9-B876-47DB58F1B1CB}" destId="{31C6116D-5871-4A7A-B7F0-49664C582129}" srcOrd="3" destOrd="0" parTransId="{F67EFF9C-1E5D-4D57-B7AD-7CF5E31FEFDB}" sibTransId="{01E3477B-1311-4AB8-A6FA-DF3FF8D7AF96}"/>
     <dgm:cxn modelId="{6A458541-37CC-47F2-B9A0-907B3CF9BF5C}" type="presOf" srcId="{73BA9B90-0D54-43B7-89C1-6D218439F9D9}" destId="{3F06902A-853F-46C4-AEE2-C54788C5705F}" srcOrd="0" destOrd="1" presId="urn:microsoft.com/office/officeart/2005/8/layout/chevron2"/>
     <dgm:cxn modelId="{CF2BD062-E9A9-4136-8037-5C18F5670AC6}" srcId="{E2F44286-75C6-4060-BB75-B86E41F8651F}" destId="{73BA9B90-0D54-43B7-89C1-6D218439F9D9}" srcOrd="1" destOrd="0" parTransId="{2F867CFF-8444-4F2A-B459-9071C8BB35D7}" sibTransId="{42E6377E-CE40-434A-AF64-8113A68AFC73}"/>
-    <dgm:cxn modelId="{C2DDF3D4-D993-40F0-ADD4-E0173D555195}" srcId="{2D9B8248-A84C-4BF9-B876-47DB58F1B1CB}" destId="{B58640A5-27C8-49EB-9BE4-C9356A3120B6}" srcOrd="1" destOrd="0" parTransId="{E69E5FDA-7DA2-4E09-B658-7BC2F00682E2}" sibTransId="{7F8DE8D2-8039-413E-9092-F0B9FEE74EDB}"/>
-    <dgm:cxn modelId="{FE7B753B-64EB-4277-8C24-7A002E5AD524}" type="presOf" srcId="{E02407B2-69BD-4223-9434-57C57DCDDD27}" destId="{C424357E-0E64-446A-BAD8-A1DC0D6478E3}" srcOrd="0" destOrd="0" presId="urn:microsoft.com/office/officeart/2005/8/layout/chevron2"/>
-    <dgm:cxn modelId="{F38E5CE9-B087-4C4D-B66F-3212C4558D77}" type="presOf" srcId="{31C6116D-5871-4A7A-B7F0-49664C582129}" destId="{D2F26B8E-6196-4DAD-AD69-9B5C6FFFFF7C}" srcOrd="0" destOrd="3" presId="urn:microsoft.com/office/officeart/2005/8/layout/chevron2"/>
-    <dgm:cxn modelId="{F8C7A0E1-1C5F-40E1-8737-405AE7993383}" srcId="{2D9B8248-A84C-4BF9-B876-47DB58F1B1CB}" destId="{31C6116D-5871-4A7A-B7F0-49664C582129}" srcOrd="3" destOrd="0" parTransId="{F67EFF9C-1E5D-4D57-B7AD-7CF5E31FEFDB}" sibTransId="{01E3477B-1311-4AB8-A6FA-DF3FF8D7AF96}"/>
-    <dgm:cxn modelId="{DBAD2216-45A6-496F-AA44-4223043B556B}" type="presOf" srcId="{E2F44286-75C6-4060-BB75-B86E41F8651F}" destId="{5CAEECB3-3614-4778-BD06-2EAB2B0729D6}" srcOrd="0" destOrd="0" presId="urn:microsoft.com/office/officeart/2005/8/layout/chevron2"/>
-    <dgm:cxn modelId="{0122400C-555E-431A-A452-6E325B2599C9}" type="presOf" srcId="{9844DEEE-5F53-4632-B3A9-4CC25F9FA117}" destId="{3F06902A-853F-46C4-AEE2-C54788C5705F}" srcOrd="0" destOrd="2" presId="urn:microsoft.com/office/officeart/2005/8/layout/chevron2"/>
-    <dgm:cxn modelId="{3788F7BD-F650-4EEE-988B-C5159D862A03}" srcId="{2D9B8248-A84C-4BF9-B876-47DB58F1B1CB}" destId="{2526652F-26EE-453A-BEC4-F01BD65CA972}" srcOrd="0" destOrd="0" parTransId="{AC7DE637-B452-4DBD-BB6E-2804A1EE89D7}" sibTransId="{D5DD4875-7775-48BD-A0A3-858CD1EBAF08}"/>
-    <dgm:cxn modelId="{0910956B-3F9C-4F31-972C-AC83A4C97581}" type="presOf" srcId="{F90FB44B-1E7D-4E17-837E-6047757F50F3}" destId="{D2F26B8E-6196-4DAD-AD69-9B5C6FFFFF7C}" srcOrd="0" destOrd="2" presId="urn:microsoft.com/office/officeart/2005/8/layout/chevron2"/>
-    <dgm:cxn modelId="{168D3F37-7B12-41E4-85C5-9F9579352DD8}" srcId="{E02407B2-69BD-4223-9434-57C57DCDDD27}" destId="{2D9B8248-A84C-4BF9-B876-47DB58F1B1CB}" srcOrd="0" destOrd="0" parTransId="{25049E3C-DA08-4E0D-9BA4-017037386E94}" sibTransId="{91129CC3-2241-4F11-8DC8-EEE2B2925724}"/>
-    <dgm:cxn modelId="{B84BE288-362A-4FA1-831E-9F1D3C16D4B8}" srcId="{2D9B8248-A84C-4BF9-B876-47DB58F1B1CB}" destId="{F90FB44B-1E7D-4E17-837E-6047757F50F3}" srcOrd="2" destOrd="0" parTransId="{B9C3D8BE-A775-473C-AFCC-DAD5B5938503}" sibTransId="{2C9A325E-B040-4298-BEBC-8A5408140973}"/>
+    <dgm:cxn modelId="{76EDDD24-0201-4E54-B98E-74B0CE1A07EE}" srcId="{E2F44286-75C6-4060-BB75-B86E41F8651F}" destId="{9844DEEE-5F53-4632-B3A9-4CC25F9FA117}" srcOrd="2" destOrd="0" parTransId="{FDFB9377-D3AC-4A1D-B392-3A928DFE3D3B}" sibTransId="{1CAC3FC4-0C25-4828-A885-E6204A6E9362}"/>
     <dgm:cxn modelId="{01DFA0BC-83CE-4825-B267-6FF61EE27E14}" srcId="{E2F44286-75C6-4060-BB75-B86E41F8651F}" destId="{37653A34-476C-4926-95FC-355BC7ED913D}" srcOrd="0" destOrd="0" parTransId="{C50763F0-0ACF-4BF9-949F-960BA6993E01}" sibTransId="{77792512-F673-4B71-8FAC-E002F1130A75}"/>
-    <dgm:cxn modelId="{DC381711-BE6C-4324-8788-17F6044CA4A7}" type="presOf" srcId="{2526652F-26EE-453A-BEC4-F01BD65CA972}" destId="{D2F26B8E-6196-4DAD-AD69-9B5C6FFFFF7C}" srcOrd="0" destOrd="0" presId="urn:microsoft.com/office/officeart/2005/8/layout/chevron2"/>
-    <dgm:cxn modelId="{76EDDD24-0201-4E54-B98E-74B0CE1A07EE}" srcId="{E2F44286-75C6-4060-BB75-B86E41F8651F}" destId="{9844DEEE-5F53-4632-B3A9-4CC25F9FA117}" srcOrd="2" destOrd="0" parTransId="{FDFB9377-D3AC-4A1D-B392-3A928DFE3D3B}" sibTransId="{1CAC3FC4-0C25-4828-A885-E6204A6E9362}"/>
-    <dgm:cxn modelId="{178B870F-A16A-453B-9F1B-6FB47A81E247}" type="presOf" srcId="{2D9B8248-A84C-4BF9-B876-47DB58F1B1CB}" destId="{E4C4D1A6-2096-486C-9408-60CFA4C9EF76}" srcOrd="0" destOrd="0" presId="urn:microsoft.com/office/officeart/2005/8/layout/chevron2"/>
-    <dgm:cxn modelId="{8139D715-8BAE-4137-89EB-86AB507ACE07}" srcId="{E02407B2-69BD-4223-9434-57C57DCDDD27}" destId="{E2F44286-75C6-4060-BB75-B86E41F8651F}" srcOrd="1" destOrd="0" parTransId="{37E68243-BF78-45C2-847B-B53BDB03EDF2}" sibTransId="{E92B269C-029C-4A84-9662-8A340EFF3DCA}"/>
     <dgm:cxn modelId="{FA6B33A3-931E-43BF-A1D3-03C494938F47}" type="presOf" srcId="{B58640A5-27C8-49EB-9BE4-C9356A3120B6}" destId="{D2F26B8E-6196-4DAD-AD69-9B5C6FFFFF7C}" srcOrd="0" destOrd="1" presId="urn:microsoft.com/office/officeart/2005/8/layout/chevron2"/>
-    <dgm:cxn modelId="{0356DF4E-C4D8-4424-8E4D-F9DBF358A002}" type="presOf" srcId="{37653A34-476C-4926-95FC-355BC7ED913D}" destId="{3F06902A-853F-46C4-AEE2-C54788C5705F}" srcOrd="0" destOrd="0" presId="urn:microsoft.com/office/officeart/2005/8/layout/chevron2"/>
     <dgm:cxn modelId="{6DC568D4-C99F-48FA-904C-8449201971A7}" type="presParOf" srcId="{C424357E-0E64-446A-BAD8-A1DC0D6478E3}" destId="{D52D5A14-EF13-4672-BEB5-FBC672B89BC7}" srcOrd="0" destOrd="0" presId="urn:microsoft.com/office/officeart/2005/8/layout/chevron2"/>
     <dgm:cxn modelId="{09CDD8AB-CCAD-42F7-9A87-DBCBDDC1215C}" type="presParOf" srcId="{D52D5A14-EF13-4672-BEB5-FBC672B89BC7}" destId="{E4C4D1A6-2096-486C-9408-60CFA4C9EF76}" srcOrd="0" destOrd="0" presId="urn:microsoft.com/office/officeart/2005/8/layout/chevron2"/>
     <dgm:cxn modelId="{51C3A3C4-01E8-4A77-BFCC-4E51780C4512}" type="presParOf" srcId="{D52D5A14-EF13-4672-BEB5-FBC672B89BC7}" destId="{D2F26B8E-6196-4DAD-AD69-9B5C6FFFFF7C}" srcOrd="1" destOrd="0" presId="urn:microsoft.com/office/officeart/2005/8/layout/chevron2"/>
@@ -2301,7 +2301,7 @@
   <dgm:whole/>
   <dgm:extLst>
     <a:ext uri="http://schemas.microsoft.com/office/drawing/2008/diagram">
-      <dsp:dataModelExt xmlns:dsp="http://schemas.microsoft.com/office/drawing/2008/diagram" relId="rId7" minVer="http://schemas.openxmlformats.org/drawingml/2006/diagram"/>
+      <dsp:dataModelExt xmlns="" xmlns:dsp="http://schemas.microsoft.com/office/drawing/2008/diagram" relId="rId7" minVer="http://schemas.openxmlformats.org/drawingml/2006/diagram"/>
     </a:ext>
   </dgm:extLst>
 </dgm:dataModel>
@@ -3037,25 +3037,25 @@
     </dgm:pt>
   </dgm:ptLst>
   <dgm:cxnLst>
+    <dgm:cxn modelId="{5802B2DD-2AF5-437B-885D-90768A93DF76}" srcId="{D41092CE-E632-472E-BFE9-905672BC2A14}" destId="{D71A2FA7-4DF3-4461-81FA-7E96E9BD50F2}" srcOrd="2" destOrd="0" parTransId="{C8F9A6C7-E079-438E-9E9C-91FEC3D40E4B}" sibTransId="{9C219817-D2B5-4BB9-A129-472E32AEF2D3}"/>
+    <dgm:cxn modelId="{56CB7CB0-8C6A-4320-B1FE-DA13993B8A59}" type="presOf" srcId="{D71A2FA7-4DF3-4461-81FA-7E96E9BD50F2}" destId="{D9FBCDAB-32D1-43DE-9771-E26F0CC349D4}" srcOrd="0" destOrd="2" presId="urn:microsoft.com/office/officeart/2005/8/layout/chevron2"/>
+    <dgm:cxn modelId="{79B44ACD-07B9-477A-9C15-9AA9477D546D}" type="presOf" srcId="{A6989CE7-70B0-4ADD-8CD7-DC0F80482316}" destId="{D9FBCDAB-32D1-43DE-9771-E26F0CC349D4}" srcOrd="0" destOrd="1" presId="urn:microsoft.com/office/officeart/2005/8/layout/chevron2"/>
+    <dgm:cxn modelId="{F51A819C-B684-4089-AF03-74CA1298B979}" type="presOf" srcId="{D41092CE-E632-472E-BFE9-905672BC2A14}" destId="{F73171B7-379D-493D-84F1-2FD107CF062A}" srcOrd="0" destOrd="0" presId="urn:microsoft.com/office/officeart/2005/8/layout/chevron2"/>
+    <dgm:cxn modelId="{2549354D-A374-4F5B-B237-C4FBAB6DD6A2}" srcId="{6F447B18-F1D3-4BF0-95AE-1157A070470E}" destId="{AE9C75AF-77C9-44A5-9DFC-14924E9BA44A}" srcOrd="1" destOrd="0" parTransId="{B49D713B-CAD7-4B0E-ACB3-8E30747444A5}" sibTransId="{78406C8D-073E-43FC-8CD5-AE9F8D6E38D5}"/>
+    <dgm:cxn modelId="{31121ACE-9614-476C-BED7-5EE6E285D2D4}" srcId="{B360F9FB-EE8A-471C-891C-5897F69AB9DD}" destId="{D41092CE-E632-472E-BFE9-905672BC2A14}" srcOrd="1" destOrd="0" parTransId="{2B0B43D8-08ED-4E76-9037-9F6E8E088DBE}" sibTransId="{F7563DD2-7DBA-46C7-AB3B-CCFFF132FE40}"/>
+    <dgm:cxn modelId="{F897611C-00F3-4F05-8787-1D4D9F7E226B}" type="presOf" srcId="{6C4ABBA2-8A32-4DFD-ACD3-014403018ECE}" destId="{D9FBCDAB-32D1-43DE-9771-E26F0CC349D4}" srcOrd="0" destOrd="4" presId="urn:microsoft.com/office/officeart/2005/8/layout/chevron2"/>
+    <dgm:cxn modelId="{EA53CC7A-B60F-48E3-AB7D-BB0C7DB97D83}" srcId="{B360F9FB-EE8A-471C-891C-5897F69AB9DD}" destId="{6F447B18-F1D3-4BF0-95AE-1157A070470E}" srcOrd="0" destOrd="0" parTransId="{63DE9012-AD21-479D-8A50-61A200D03A87}" sibTransId="{04C1351D-4F9D-41E0-8419-25BBB33C677A}"/>
+    <dgm:cxn modelId="{ADD6EBC1-20E8-4447-9637-D4690C9C6526}" srcId="{D41092CE-E632-472E-BFE9-905672BC2A14}" destId="{9A02E4BF-8E82-4AF9-8929-7601FF468FE4}" srcOrd="3" destOrd="0" parTransId="{A853D27E-BC35-4652-B21A-EF1CDA51A178}" sibTransId="{605B37C2-29ED-4F95-9AB2-A9E18779102B}"/>
+    <dgm:cxn modelId="{B6AFB302-06FE-4159-98CE-8B932F383622}" type="presOf" srcId="{5FA60E9C-35EB-49FD-A6F2-B0B62DE2260E}" destId="{D9FBCDAB-32D1-43DE-9771-E26F0CC349D4}" srcOrd="0" destOrd="0" presId="urn:microsoft.com/office/officeart/2005/8/layout/chevron2"/>
+    <dgm:cxn modelId="{9877ACA8-34DC-457D-840A-2AC8ECE7E95C}" type="presOf" srcId="{AE9C75AF-77C9-44A5-9DFC-14924E9BA44A}" destId="{8C551C38-8476-4B3B-A8DB-E46593C6F9F6}" srcOrd="0" destOrd="1" presId="urn:microsoft.com/office/officeart/2005/8/layout/chevron2"/>
     <dgm:cxn modelId="{2A5E55AE-9F4C-4C29-8687-4AA1C1769361}" srcId="{6F447B18-F1D3-4BF0-95AE-1157A070470E}" destId="{745B836D-FD61-4FE2-8F83-22704F489395}" srcOrd="0" destOrd="0" parTransId="{CBEE568F-5223-4C26-960C-B293F3A38F4B}" sibTransId="{896DC825-FB0C-4D43-801D-A6C578F99744}"/>
-    <dgm:cxn modelId="{F897611C-00F3-4F05-8787-1D4D9F7E226B}" type="presOf" srcId="{6C4ABBA2-8A32-4DFD-ACD3-014403018ECE}" destId="{D9FBCDAB-32D1-43DE-9771-E26F0CC349D4}" srcOrd="0" destOrd="4" presId="urn:microsoft.com/office/officeart/2005/8/layout/chevron2"/>
-    <dgm:cxn modelId="{1A5CF49F-9225-410F-86E3-5043B3F13B38}" srcId="{D41092CE-E632-472E-BFE9-905672BC2A14}" destId="{6C4ABBA2-8A32-4DFD-ACD3-014403018ECE}" srcOrd="4" destOrd="0" parTransId="{B1B4C8DB-9B40-4A62-AF24-114478E642A6}" sibTransId="{09216A8E-180A-45DB-8A9D-DE222A313D3E}"/>
+    <dgm:cxn modelId="{D2DF9F2A-0036-483B-BDEA-C7D9B8058B95}" srcId="{D41092CE-E632-472E-BFE9-905672BC2A14}" destId="{5FA60E9C-35EB-49FD-A6F2-B0B62DE2260E}" srcOrd="0" destOrd="0" parTransId="{3D99AEF6-3383-4272-A1AA-8DF10AF1532C}" sibTransId="{56381DFC-6A85-4F8F-BCF3-0ACD56879987}"/>
     <dgm:cxn modelId="{5BAE417C-9FAF-4208-9BE7-5E0A35BB4AE6}" type="presOf" srcId="{6F447B18-F1D3-4BF0-95AE-1157A070470E}" destId="{6E134F9C-B20F-4DF8-AB0E-EA3D6ACEE58D}" srcOrd="0" destOrd="0" presId="urn:microsoft.com/office/officeart/2005/8/layout/chevron2"/>
-    <dgm:cxn modelId="{B6AFB302-06FE-4159-98CE-8B932F383622}" type="presOf" srcId="{5FA60E9C-35EB-49FD-A6F2-B0B62DE2260E}" destId="{D9FBCDAB-32D1-43DE-9771-E26F0CC349D4}" srcOrd="0" destOrd="0" presId="urn:microsoft.com/office/officeart/2005/8/layout/chevron2"/>
-    <dgm:cxn modelId="{31121ACE-9614-476C-BED7-5EE6E285D2D4}" srcId="{B360F9FB-EE8A-471C-891C-5897F69AB9DD}" destId="{D41092CE-E632-472E-BFE9-905672BC2A14}" srcOrd="1" destOrd="0" parTransId="{2B0B43D8-08ED-4E76-9037-9F6E8E088DBE}" sibTransId="{F7563DD2-7DBA-46C7-AB3B-CCFFF132FE40}"/>
-    <dgm:cxn modelId="{02924F47-F6F7-4D99-822E-F229FB89FD39}" type="presOf" srcId="{9A02E4BF-8E82-4AF9-8929-7601FF468FE4}" destId="{D9FBCDAB-32D1-43DE-9771-E26F0CC349D4}" srcOrd="0" destOrd="3" presId="urn:microsoft.com/office/officeart/2005/8/layout/chevron2"/>
-    <dgm:cxn modelId="{56CB7CB0-8C6A-4320-B1FE-DA13993B8A59}" type="presOf" srcId="{D71A2FA7-4DF3-4461-81FA-7E96E9BD50F2}" destId="{D9FBCDAB-32D1-43DE-9771-E26F0CC349D4}" srcOrd="0" destOrd="2" presId="urn:microsoft.com/office/officeart/2005/8/layout/chevron2"/>
-    <dgm:cxn modelId="{2549354D-A374-4F5B-B237-C4FBAB6DD6A2}" srcId="{6F447B18-F1D3-4BF0-95AE-1157A070470E}" destId="{AE9C75AF-77C9-44A5-9DFC-14924E9BA44A}" srcOrd="1" destOrd="0" parTransId="{B49D713B-CAD7-4B0E-ACB3-8E30747444A5}" sibTransId="{78406C8D-073E-43FC-8CD5-AE9F8D6E38D5}"/>
-    <dgm:cxn modelId="{D2DF9F2A-0036-483B-BDEA-C7D9B8058B95}" srcId="{D41092CE-E632-472E-BFE9-905672BC2A14}" destId="{5FA60E9C-35EB-49FD-A6F2-B0B62DE2260E}" srcOrd="0" destOrd="0" parTransId="{3D99AEF6-3383-4272-A1AA-8DF10AF1532C}" sibTransId="{56381DFC-6A85-4F8F-BCF3-0ACD56879987}"/>
-    <dgm:cxn modelId="{25B2DBA3-F5FE-4618-BEB0-54DA6DC74219}" type="presOf" srcId="{B360F9FB-EE8A-471C-891C-5897F69AB9DD}" destId="{97283E80-DBEF-499E-94F2-403421E1C111}" srcOrd="0" destOrd="0" presId="urn:microsoft.com/office/officeart/2005/8/layout/chevron2"/>
-    <dgm:cxn modelId="{ADD6EBC1-20E8-4447-9637-D4690C9C6526}" srcId="{D41092CE-E632-472E-BFE9-905672BC2A14}" destId="{9A02E4BF-8E82-4AF9-8929-7601FF468FE4}" srcOrd="3" destOrd="0" parTransId="{A853D27E-BC35-4652-B21A-EF1CDA51A178}" sibTransId="{605B37C2-29ED-4F95-9AB2-A9E18779102B}"/>
-    <dgm:cxn modelId="{F51A819C-B684-4089-AF03-74CA1298B979}" type="presOf" srcId="{D41092CE-E632-472E-BFE9-905672BC2A14}" destId="{F73171B7-379D-493D-84F1-2FD107CF062A}" srcOrd="0" destOrd="0" presId="urn:microsoft.com/office/officeart/2005/8/layout/chevron2"/>
-    <dgm:cxn modelId="{EA53CC7A-B60F-48E3-AB7D-BB0C7DB97D83}" srcId="{B360F9FB-EE8A-471C-891C-5897F69AB9DD}" destId="{6F447B18-F1D3-4BF0-95AE-1157A070470E}" srcOrd="0" destOrd="0" parTransId="{63DE9012-AD21-479D-8A50-61A200D03A87}" sibTransId="{04C1351D-4F9D-41E0-8419-25BBB33C677A}"/>
-    <dgm:cxn modelId="{79B44ACD-07B9-477A-9C15-9AA9477D546D}" type="presOf" srcId="{A6989CE7-70B0-4ADD-8CD7-DC0F80482316}" destId="{D9FBCDAB-32D1-43DE-9771-E26F0CC349D4}" srcOrd="0" destOrd="1" presId="urn:microsoft.com/office/officeart/2005/8/layout/chevron2"/>
-    <dgm:cxn modelId="{5802B2DD-2AF5-437B-885D-90768A93DF76}" srcId="{D41092CE-E632-472E-BFE9-905672BC2A14}" destId="{D71A2FA7-4DF3-4461-81FA-7E96E9BD50F2}" srcOrd="2" destOrd="0" parTransId="{C8F9A6C7-E079-438E-9E9C-91FEC3D40E4B}" sibTransId="{9C219817-D2B5-4BB9-A129-472E32AEF2D3}"/>
-    <dgm:cxn modelId="{9877ACA8-34DC-457D-840A-2AC8ECE7E95C}" type="presOf" srcId="{AE9C75AF-77C9-44A5-9DFC-14924E9BA44A}" destId="{8C551C38-8476-4B3B-A8DB-E46593C6F9F6}" srcOrd="0" destOrd="1" presId="urn:microsoft.com/office/officeart/2005/8/layout/chevron2"/>
     <dgm:cxn modelId="{16F9E793-E0F7-4BF4-8984-370BC8F68FA4}" type="presOf" srcId="{745B836D-FD61-4FE2-8F83-22704F489395}" destId="{8C551C38-8476-4B3B-A8DB-E46593C6F9F6}" srcOrd="0" destOrd="0" presId="urn:microsoft.com/office/officeart/2005/8/layout/chevron2"/>
     <dgm:cxn modelId="{790E384C-3792-4EC1-9116-B538BCE070E6}" srcId="{D41092CE-E632-472E-BFE9-905672BC2A14}" destId="{A6989CE7-70B0-4ADD-8CD7-DC0F80482316}" srcOrd="1" destOrd="0" parTransId="{DC813217-2496-45F6-9068-F82EC8001E9A}" sibTransId="{19E896F7-A945-4DD6-8477-58975323EE49}"/>
+    <dgm:cxn modelId="{02924F47-F6F7-4D99-822E-F229FB89FD39}" type="presOf" srcId="{9A02E4BF-8E82-4AF9-8929-7601FF468FE4}" destId="{D9FBCDAB-32D1-43DE-9771-E26F0CC349D4}" srcOrd="0" destOrd="3" presId="urn:microsoft.com/office/officeart/2005/8/layout/chevron2"/>
+    <dgm:cxn modelId="{1A5CF49F-9225-410F-86E3-5043B3F13B38}" srcId="{D41092CE-E632-472E-BFE9-905672BC2A14}" destId="{6C4ABBA2-8A32-4DFD-ACD3-014403018ECE}" srcOrd="4" destOrd="0" parTransId="{B1B4C8DB-9B40-4A62-AF24-114478E642A6}" sibTransId="{09216A8E-180A-45DB-8A9D-DE222A313D3E}"/>
+    <dgm:cxn modelId="{25B2DBA3-F5FE-4618-BEB0-54DA6DC74219}" type="presOf" srcId="{B360F9FB-EE8A-471C-891C-5897F69AB9DD}" destId="{97283E80-DBEF-499E-94F2-403421E1C111}" srcOrd="0" destOrd="0" presId="urn:microsoft.com/office/officeart/2005/8/layout/chevron2"/>
     <dgm:cxn modelId="{2D3A4EC9-8B00-4318-A4DB-ACF90FD82BA0}" type="presParOf" srcId="{97283E80-DBEF-499E-94F2-403421E1C111}" destId="{0536BA81-3AA1-48FE-A87F-3BA512D8998C}" srcOrd="0" destOrd="0" presId="urn:microsoft.com/office/officeart/2005/8/layout/chevron2"/>
     <dgm:cxn modelId="{DBD8D96A-1254-434D-9388-83CFB62CC651}" type="presParOf" srcId="{0536BA81-3AA1-48FE-A87F-3BA512D8998C}" destId="{6E134F9C-B20F-4DF8-AB0E-EA3D6ACEE58D}" srcOrd="0" destOrd="0" presId="urn:microsoft.com/office/officeart/2005/8/layout/chevron2"/>
     <dgm:cxn modelId="{58E8171F-9B10-471E-8A96-59613E88CF55}" type="presParOf" srcId="{0536BA81-3AA1-48FE-A87F-3BA512D8998C}" destId="{8C551C38-8476-4B3B-A8DB-E46593C6F9F6}" srcOrd="1" destOrd="0" presId="urn:microsoft.com/office/officeart/2005/8/layout/chevron2"/>
@@ -3068,7 +3068,7 @@
   <dgm:whole/>
   <dgm:extLst>
     <a:ext uri="http://schemas.microsoft.com/office/drawing/2008/diagram">
-      <dsp:dataModelExt xmlns:dsp="http://schemas.microsoft.com/office/drawing/2008/diagram" relId="rId8" minVer="http://schemas.openxmlformats.org/drawingml/2006/diagram"/>
+      <dsp:dataModelExt xmlns="" xmlns:dsp="http://schemas.microsoft.com/office/drawing/2008/diagram" relId="rId8" minVer="http://schemas.openxmlformats.org/drawingml/2006/diagram"/>
     </a:ext>
   </dgm:extLst>
 </dgm:dataModel>
@@ -6721,7 +6721,8 @@
           <a:p>
             <a:fld id="{662B9B9A-466F-4546-9579-E25DFEC82403}" type="datetimeFigureOut">
               <a:rPr lang="en-US" smtClean="0"/>
-              <a:t>12/20/2022</a:t>
+              <a:pPr/>
+              <a:t>12/21/2022</a:t>
             </a:fld>
             <a:endParaRPr lang="en-US"/>
           </a:p>
@@ -6880,6 +6881,7 @@
           <a:p>
             <a:fld id="{18FF170B-E49F-42B6-90E7-EAACD4953A3D}" type="slidenum">
               <a:rPr lang="en-US" smtClean="0"/>
+              <a:pPr/>
               <a:t>‹#›</a:t>
             </a:fld>
             <a:endParaRPr lang="en-US"/>
@@ -6889,7 +6891,7 @@
     </p:spTree>
     <p:extLst>
       <p:ext uri="{BB962C8B-B14F-4D97-AF65-F5344CB8AC3E}">
-        <p14:creationId xmlns:p14="http://schemas.microsoft.com/office/powerpoint/2010/main" val="2631924280"/>
+        <p14:creationId xmlns="" xmlns:p14="http://schemas.microsoft.com/office/powerpoint/2010/main" val="2631924280"/>
       </p:ext>
     </p:extLst>
   </p:cSld>
@@ -7054,6 +7056,7 @@
           <a:p>
             <a:fld id="{18FF170B-E49F-42B6-90E7-EAACD4953A3D}" type="slidenum">
               <a:rPr lang="en-US" smtClean="0"/>
+              <a:pPr/>
               <a:t>1</a:t>
             </a:fld>
             <a:endParaRPr lang="en-US"/>
@@ -7063,7 +7066,7 @@
     </p:spTree>
     <p:extLst>
       <p:ext uri="{BB962C8B-B14F-4D97-AF65-F5344CB8AC3E}">
-        <p14:creationId xmlns:p14="http://schemas.microsoft.com/office/powerpoint/2010/main" val="466179550"/>
+        <p14:creationId xmlns="" xmlns:p14="http://schemas.microsoft.com/office/powerpoint/2010/main" val="466179550"/>
       </p:ext>
     </p:extLst>
   </p:cSld>
@@ -7138,6 +7141,7 @@
           <a:p>
             <a:fld id="{18FF170B-E49F-42B6-90E7-EAACD4953A3D}" type="slidenum">
               <a:rPr lang="en-US" smtClean="0"/>
+              <a:pPr/>
               <a:t>3</a:t>
             </a:fld>
             <a:endParaRPr lang="en-US"/>
@@ -7147,7 +7151,7 @@
     </p:spTree>
     <p:extLst>
       <p:ext uri="{BB962C8B-B14F-4D97-AF65-F5344CB8AC3E}">
-        <p14:creationId xmlns:p14="http://schemas.microsoft.com/office/powerpoint/2010/main" val="1089839332"/>
+        <p14:creationId xmlns="" xmlns:p14="http://schemas.microsoft.com/office/powerpoint/2010/main" val="1089839332"/>
       </p:ext>
     </p:extLst>
   </p:cSld>
@@ -7222,6 +7226,7 @@
           <a:p>
             <a:fld id="{18FF170B-E49F-42B6-90E7-EAACD4953A3D}" type="slidenum">
               <a:rPr lang="en-US" smtClean="0"/>
+              <a:pPr/>
               <a:t>4</a:t>
             </a:fld>
             <a:endParaRPr lang="en-US"/>
@@ -7231,7 +7236,7 @@
     </p:spTree>
     <p:extLst>
       <p:ext uri="{BB962C8B-B14F-4D97-AF65-F5344CB8AC3E}">
-        <p14:creationId xmlns:p14="http://schemas.microsoft.com/office/powerpoint/2010/main" val="3413316932"/>
+        <p14:creationId xmlns="" xmlns:p14="http://schemas.microsoft.com/office/powerpoint/2010/main" val="3413316932"/>
       </p:ext>
     </p:extLst>
   </p:cSld>
@@ -7306,6 +7311,7 @@
           <a:p>
             <a:fld id="{18FF170B-E49F-42B6-90E7-EAACD4953A3D}" type="slidenum">
               <a:rPr lang="en-US" smtClean="0"/>
+              <a:pPr/>
               <a:t>5</a:t>
             </a:fld>
             <a:endParaRPr lang="en-US"/>
@@ -7315,7 +7321,7 @@
     </p:spTree>
     <p:extLst>
       <p:ext uri="{BB962C8B-B14F-4D97-AF65-F5344CB8AC3E}">
-        <p14:creationId xmlns:p14="http://schemas.microsoft.com/office/powerpoint/2010/main" val="821567318"/>
+        <p14:creationId xmlns="" xmlns:p14="http://schemas.microsoft.com/office/powerpoint/2010/main" val="821567318"/>
       </p:ext>
     </p:extLst>
   </p:cSld>
@@ -7390,7 +7396,8 @@
           <a:p>
             <a:fld id="{18FF170B-E49F-42B6-90E7-EAACD4953A3D}" type="slidenum">
               <a:rPr lang="en-US" smtClean="0"/>
-              <a:t>7</a:t>
+              <a:pPr/>
+              <a:t>6</a:t>
             </a:fld>
             <a:endParaRPr lang="en-US"/>
           </a:p>
@@ -7399,7 +7406,7 @@
     </p:spTree>
     <p:extLst>
       <p:ext uri="{BB962C8B-B14F-4D97-AF65-F5344CB8AC3E}">
-        <p14:creationId xmlns:p14="http://schemas.microsoft.com/office/powerpoint/2010/main" val="660193593"/>
+        <p14:creationId xmlns="" xmlns:p14="http://schemas.microsoft.com/office/powerpoint/2010/main" val="660193593"/>
       </p:ext>
     </p:extLst>
   </p:cSld>
@@ -7474,6 +7481,7 @@
           <a:p>
             <a:fld id="{18FF170B-E49F-42B6-90E7-EAACD4953A3D}" type="slidenum">
               <a:rPr lang="en-US" smtClean="0"/>
+              <a:pPr/>
               <a:t>8</a:t>
             </a:fld>
             <a:endParaRPr lang="en-US"/>
@@ -7483,7 +7491,7 @@
     </p:spTree>
     <p:extLst>
       <p:ext uri="{BB962C8B-B14F-4D97-AF65-F5344CB8AC3E}">
-        <p14:creationId xmlns:p14="http://schemas.microsoft.com/office/powerpoint/2010/main" val="921567449"/>
+        <p14:creationId xmlns="" xmlns:p14="http://schemas.microsoft.com/office/powerpoint/2010/main" val="921567449"/>
       </p:ext>
     </p:extLst>
   </p:cSld>
@@ -7558,6 +7566,7 @@
           <a:p>
             <a:fld id="{18FF170B-E49F-42B6-90E7-EAACD4953A3D}" type="slidenum">
               <a:rPr lang="en-US" smtClean="0"/>
+              <a:pPr/>
               <a:t>10</a:t>
             </a:fld>
             <a:endParaRPr lang="en-US"/>
@@ -7567,7 +7576,7 @@
     </p:spTree>
     <p:extLst>
       <p:ext uri="{BB962C8B-B14F-4D97-AF65-F5344CB8AC3E}">
-        <p14:creationId xmlns:p14="http://schemas.microsoft.com/office/powerpoint/2010/main" val="498102105"/>
+        <p14:creationId xmlns="" xmlns:p14="http://schemas.microsoft.com/office/powerpoint/2010/main" val="498102105"/>
       </p:ext>
     </p:extLst>
   </p:cSld>
@@ -7642,6 +7651,7 @@
           <a:p>
             <a:fld id="{18FF170B-E49F-42B6-90E7-EAACD4953A3D}" type="slidenum">
               <a:rPr lang="en-US" smtClean="0"/>
+              <a:pPr/>
               <a:t>11</a:t>
             </a:fld>
             <a:endParaRPr lang="en-US"/>
@@ -7651,7 +7661,7 @@
     </p:spTree>
     <p:extLst>
       <p:ext uri="{BB962C8B-B14F-4D97-AF65-F5344CB8AC3E}">
-        <p14:creationId xmlns:p14="http://schemas.microsoft.com/office/powerpoint/2010/main" val="4101510357"/>
+        <p14:creationId xmlns="" xmlns:p14="http://schemas.microsoft.com/office/powerpoint/2010/main" val="4101510357"/>
       </p:ext>
     </p:extLst>
   </p:cSld>
@@ -7726,6 +7736,7 @@
           <a:p>
             <a:fld id="{18FF170B-E49F-42B6-90E7-EAACD4953A3D}" type="slidenum">
               <a:rPr lang="en-US" smtClean="0"/>
+              <a:pPr/>
               <a:t>12</a:t>
             </a:fld>
             <a:endParaRPr lang="en-US"/>
@@ -7735,7 +7746,7 @@
     </p:spTree>
     <p:extLst>
       <p:ext uri="{BB962C8B-B14F-4D97-AF65-F5344CB8AC3E}">
-        <p14:creationId xmlns:p14="http://schemas.microsoft.com/office/powerpoint/2010/main" val="1189910978"/>
+        <p14:creationId xmlns="" xmlns:p14="http://schemas.microsoft.com/office/powerpoint/2010/main" val="1189910978"/>
       </p:ext>
     </p:extLst>
   </p:cSld>
@@ -7918,6 +7929,7 @@
           <a:p>
             <a:fld id="{750FFBE5-4B2F-4234-A7E0-04D60560B238}" type="slidenum">
               <a:rPr lang="en-US" smtClean="0"/>
+              <a:pPr/>
               <a:t>‹#›</a:t>
             </a:fld>
             <a:endParaRPr lang="en-US"/>
@@ -7927,7 +7939,7 @@
     </p:spTree>
     <p:extLst>
       <p:ext uri="{BB962C8B-B14F-4D97-AF65-F5344CB8AC3E}">
-        <p14:creationId xmlns:p14="http://schemas.microsoft.com/office/powerpoint/2010/main" val="315994753"/>
+        <p14:creationId xmlns="" xmlns:p14="http://schemas.microsoft.com/office/powerpoint/2010/main" val="315994753"/>
       </p:ext>
     </p:extLst>
   </p:cSld>
@@ -8088,6 +8100,7 @@
           <a:p>
             <a:fld id="{750FFBE5-4B2F-4234-A7E0-04D60560B238}" type="slidenum">
               <a:rPr lang="en-US" smtClean="0"/>
+              <a:pPr/>
               <a:t>‹#›</a:t>
             </a:fld>
             <a:endParaRPr lang="en-US"/>
@@ -8097,7 +8110,7 @@
     </p:spTree>
     <p:extLst>
       <p:ext uri="{BB962C8B-B14F-4D97-AF65-F5344CB8AC3E}">
-        <p14:creationId xmlns:p14="http://schemas.microsoft.com/office/powerpoint/2010/main" val="2650617954"/>
+        <p14:creationId xmlns="" xmlns:p14="http://schemas.microsoft.com/office/powerpoint/2010/main" val="2650617954"/>
       </p:ext>
     </p:extLst>
   </p:cSld>
@@ -8268,6 +8281,7 @@
           <a:p>
             <a:fld id="{750FFBE5-4B2F-4234-A7E0-04D60560B238}" type="slidenum">
               <a:rPr lang="en-US" smtClean="0"/>
+              <a:pPr/>
               <a:t>‹#›</a:t>
             </a:fld>
             <a:endParaRPr lang="en-US"/>
@@ -8277,7 +8291,7 @@
     </p:spTree>
     <p:extLst>
       <p:ext uri="{BB962C8B-B14F-4D97-AF65-F5344CB8AC3E}">
-        <p14:creationId xmlns:p14="http://schemas.microsoft.com/office/powerpoint/2010/main" val="3861832035"/>
+        <p14:creationId xmlns="" xmlns:p14="http://schemas.microsoft.com/office/powerpoint/2010/main" val="3861832035"/>
       </p:ext>
     </p:extLst>
   </p:cSld>
@@ -8438,6 +8452,7 @@
           <a:p>
             <a:fld id="{750FFBE5-4B2F-4234-A7E0-04D60560B238}" type="slidenum">
               <a:rPr lang="en-US" smtClean="0"/>
+              <a:pPr/>
               <a:t>‹#›</a:t>
             </a:fld>
             <a:endParaRPr lang="en-US"/>
@@ -8447,7 +8462,7 @@
     </p:spTree>
     <p:extLst>
       <p:ext uri="{BB962C8B-B14F-4D97-AF65-F5344CB8AC3E}">
-        <p14:creationId xmlns:p14="http://schemas.microsoft.com/office/powerpoint/2010/main" val="2465667270"/>
+        <p14:creationId xmlns="" xmlns:p14="http://schemas.microsoft.com/office/powerpoint/2010/main" val="2465667270"/>
       </p:ext>
     </p:extLst>
   </p:cSld>
@@ -8684,6 +8699,7 @@
           <a:p>
             <a:fld id="{750FFBE5-4B2F-4234-A7E0-04D60560B238}" type="slidenum">
               <a:rPr lang="en-US" smtClean="0"/>
+              <a:pPr/>
               <a:t>‹#›</a:t>
             </a:fld>
             <a:endParaRPr lang="en-US"/>
@@ -8693,7 +8709,7 @@
     </p:spTree>
     <p:extLst>
       <p:ext uri="{BB962C8B-B14F-4D97-AF65-F5344CB8AC3E}">
-        <p14:creationId xmlns:p14="http://schemas.microsoft.com/office/powerpoint/2010/main" val="1651082170"/>
+        <p14:creationId xmlns="" xmlns:p14="http://schemas.microsoft.com/office/powerpoint/2010/main" val="1651082170"/>
       </p:ext>
     </p:extLst>
   </p:cSld>
@@ -8916,6 +8932,7 @@
           <a:p>
             <a:fld id="{750FFBE5-4B2F-4234-A7E0-04D60560B238}" type="slidenum">
               <a:rPr lang="en-US" smtClean="0"/>
+              <a:pPr/>
               <a:t>‹#›</a:t>
             </a:fld>
             <a:endParaRPr lang="en-US"/>
@@ -8925,7 +8942,7 @@
     </p:spTree>
     <p:extLst>
       <p:ext uri="{BB962C8B-B14F-4D97-AF65-F5344CB8AC3E}">
-        <p14:creationId xmlns:p14="http://schemas.microsoft.com/office/powerpoint/2010/main" val="3147959619"/>
+        <p14:creationId xmlns="" xmlns:p14="http://schemas.microsoft.com/office/powerpoint/2010/main" val="3147959619"/>
       </p:ext>
     </p:extLst>
   </p:cSld>
@@ -9283,6 +9300,7 @@
           <a:p>
             <a:fld id="{750FFBE5-4B2F-4234-A7E0-04D60560B238}" type="slidenum">
               <a:rPr lang="en-US" smtClean="0"/>
+              <a:pPr/>
               <a:t>‹#›</a:t>
             </a:fld>
             <a:endParaRPr lang="en-US"/>
@@ -9292,7 +9310,7 @@
     </p:spTree>
     <p:extLst>
       <p:ext uri="{BB962C8B-B14F-4D97-AF65-F5344CB8AC3E}">
-        <p14:creationId xmlns:p14="http://schemas.microsoft.com/office/powerpoint/2010/main" val="1910059453"/>
+        <p14:creationId xmlns="" xmlns:p14="http://schemas.microsoft.com/office/powerpoint/2010/main" val="1910059453"/>
       </p:ext>
     </p:extLst>
   </p:cSld>
@@ -9401,6 +9419,7 @@
           <a:p>
             <a:fld id="{750FFBE5-4B2F-4234-A7E0-04D60560B238}" type="slidenum">
               <a:rPr lang="en-US" smtClean="0"/>
+              <a:pPr/>
               <a:t>‹#›</a:t>
             </a:fld>
             <a:endParaRPr lang="en-US"/>
@@ -9410,7 +9429,7 @@
     </p:spTree>
     <p:extLst>
       <p:ext uri="{BB962C8B-B14F-4D97-AF65-F5344CB8AC3E}">
-        <p14:creationId xmlns:p14="http://schemas.microsoft.com/office/powerpoint/2010/main" val="3861698740"/>
+        <p14:creationId xmlns="" xmlns:p14="http://schemas.microsoft.com/office/powerpoint/2010/main" val="3861698740"/>
       </p:ext>
     </p:extLst>
   </p:cSld>
@@ -9496,6 +9515,7 @@
           <a:p>
             <a:fld id="{750FFBE5-4B2F-4234-A7E0-04D60560B238}" type="slidenum">
               <a:rPr lang="en-US" smtClean="0"/>
+              <a:pPr/>
               <a:t>‹#›</a:t>
             </a:fld>
             <a:endParaRPr lang="en-US"/>
@@ -9505,7 +9525,7 @@
     </p:spTree>
     <p:extLst>
       <p:ext uri="{BB962C8B-B14F-4D97-AF65-F5344CB8AC3E}">
-        <p14:creationId xmlns:p14="http://schemas.microsoft.com/office/powerpoint/2010/main" val="3848882425"/>
+        <p14:creationId xmlns="" xmlns:p14="http://schemas.microsoft.com/office/powerpoint/2010/main" val="3848882425"/>
       </p:ext>
     </p:extLst>
   </p:cSld>
@@ -9773,6 +9793,7 @@
           <a:p>
             <a:fld id="{750FFBE5-4B2F-4234-A7E0-04D60560B238}" type="slidenum">
               <a:rPr lang="en-US" smtClean="0"/>
+              <a:pPr/>
               <a:t>‹#›</a:t>
             </a:fld>
             <a:endParaRPr lang="en-US"/>
@@ -9782,7 +9803,7 @@
     </p:spTree>
     <p:extLst>
       <p:ext uri="{BB962C8B-B14F-4D97-AF65-F5344CB8AC3E}">
-        <p14:creationId xmlns:p14="http://schemas.microsoft.com/office/powerpoint/2010/main" val="119033593"/>
+        <p14:creationId xmlns="" xmlns:p14="http://schemas.microsoft.com/office/powerpoint/2010/main" val="119033593"/>
       </p:ext>
     </p:extLst>
   </p:cSld>
@@ -10026,6 +10047,7 @@
           <a:p>
             <a:fld id="{750FFBE5-4B2F-4234-A7E0-04D60560B238}" type="slidenum">
               <a:rPr lang="en-US" smtClean="0"/>
+              <a:pPr/>
               <a:t>‹#›</a:t>
             </a:fld>
             <a:endParaRPr lang="en-US"/>
@@ -10035,7 +10057,7 @@
     </p:spTree>
     <p:extLst>
       <p:ext uri="{BB962C8B-B14F-4D97-AF65-F5344CB8AC3E}">
-        <p14:creationId xmlns:p14="http://schemas.microsoft.com/office/powerpoint/2010/main" val="1493811130"/>
+        <p14:creationId xmlns="" xmlns:p14="http://schemas.microsoft.com/office/powerpoint/2010/main" val="1493811130"/>
       </p:ext>
     </p:extLst>
   </p:cSld>
@@ -10275,6 +10297,7 @@
           <a:p>
             <a:fld id="{750FFBE5-4B2F-4234-A7E0-04D60560B238}" type="slidenum">
               <a:rPr lang="en-US" smtClean="0"/>
+              <a:pPr/>
               <a:t>‹#›</a:t>
             </a:fld>
             <a:endParaRPr lang="en-US"/>
@@ -10284,7 +10307,7 @@
     </p:spTree>
     <p:extLst>
       <p:ext uri="{BB962C8B-B14F-4D97-AF65-F5344CB8AC3E}">
-        <p14:creationId xmlns:p14="http://schemas.microsoft.com/office/powerpoint/2010/main" val="3937697936"/>
+        <p14:creationId xmlns="" xmlns:p14="http://schemas.microsoft.com/office/powerpoint/2010/main" val="3937697936"/>
       </p:ext>
     </p:extLst>
   </p:cSld>
@@ -10615,7 +10638,7 @@
           <a:blip r:embed="rId3">
             <a:extLst>
               <a:ext uri="{28A0092B-C50C-407E-A947-70E740481C1C}">
-                <a14:useLocalDpi xmlns:a14="http://schemas.microsoft.com/office/drawing/2010/main" val="0"/>
+                <a14:useLocalDpi xmlns="" xmlns:a14="http://schemas.microsoft.com/office/drawing/2010/main" val="0"/>
               </a:ext>
             </a:extLst>
           </a:blip>
@@ -10627,7 +10650,7 @@
         <p:spPr bwMode="auto">
           <a:xfrm>
             <a:off x="3702309" y="29586"/>
-            <a:ext cx="4494712" cy="2022621"/>
+            <a:ext cx="4085857" cy="2022621"/>
           </a:xfrm>
           <a:prstGeom prst="rect">
             <a:avLst/>
@@ -10635,7 +10658,7 @@
           <a:noFill/>
           <a:extLst>
             <a:ext uri="{909E8E84-426E-40DD-AFC4-6F175D3DCCD1}">
-              <a14:hiddenFill xmlns:a14="http://schemas.microsoft.com/office/drawing/2010/main">
+              <a14:hiddenFill xmlns="" xmlns:a14="http://schemas.microsoft.com/office/drawing/2010/main">
                 <a:solidFill>
                   <a:srgbClr val="FFFFFF"/>
                 </a:solidFill>
@@ -10732,7 +10755,7 @@
           <a:blip r:embed="rId4">
             <a:extLst>
               <a:ext uri="{28A0092B-C50C-407E-A947-70E740481C1C}">
-                <a14:useLocalDpi xmlns:a14="http://schemas.microsoft.com/office/drawing/2010/main" val="0"/>
+                <a14:useLocalDpi xmlns="" xmlns:a14="http://schemas.microsoft.com/office/drawing/2010/main" val="0"/>
               </a:ext>
             </a:extLst>
           </a:blip>
@@ -10741,8 +10764,8 @@
         </p:blipFill>
         <p:spPr bwMode="auto">
           <a:xfrm>
-            <a:off x="1186607" y="1309686"/>
-            <a:ext cx="9935280" cy="4087262"/>
+            <a:off x="1734207" y="1309686"/>
+            <a:ext cx="8529145" cy="4087262"/>
           </a:xfrm>
           <a:prstGeom prst="rect">
             <a:avLst/>
@@ -10750,7 +10773,7 @@
           <a:noFill/>
           <a:extLst>
             <a:ext uri="{909E8E84-426E-40DD-AFC4-6F175D3DCCD1}">
-              <a14:hiddenFill xmlns:a14="http://schemas.microsoft.com/office/drawing/2010/main">
+              <a14:hiddenFill xmlns="" xmlns:a14="http://schemas.microsoft.com/office/drawing/2010/main">
                 <a:solidFill>
                   <a:srgbClr val="FFFFFF"/>
                 </a:solidFill>
@@ -10804,6 +10827,7 @@
           <a:p>
             <a:fld id="{750FFBE5-4B2F-4234-A7E0-04D60560B238}" type="slidenum">
               <a:rPr lang="en-US" smtClean="0"/>
+              <a:pPr/>
               <a:t>1</a:t>
             </a:fld>
             <a:endParaRPr lang="en-US" dirty="0"/>
@@ -10888,7 +10912,7 @@
     </p:spTree>
     <p:extLst>
       <p:ext uri="{BB962C8B-B14F-4D97-AF65-F5344CB8AC3E}">
-        <p14:creationId xmlns:p14="http://schemas.microsoft.com/office/powerpoint/2010/main" val="4102319670"/>
+        <p14:creationId xmlns="" xmlns:p14="http://schemas.microsoft.com/office/powerpoint/2010/main" val="4102319670"/>
       </p:ext>
     </p:extLst>
   </p:cSld>
@@ -10999,6 +11023,7 @@
           <a:p>
             <a:fld id="{750FFBE5-4B2F-4234-A7E0-04D60560B238}" type="slidenum">
               <a:rPr lang="en-US" smtClean="0"/>
+              <a:pPr/>
               <a:t>10</a:t>
             </a:fld>
             <a:endParaRPr lang="en-US" dirty="0"/>
@@ -11040,7 +11065,7 @@
           <a:blip r:embed="rId3">
             <a:extLst>
               <a:ext uri="{28A0092B-C50C-407E-A947-70E740481C1C}">
-                <a14:useLocalDpi xmlns:a14="http://schemas.microsoft.com/office/drawing/2010/main" val="0"/>
+                <a14:useLocalDpi xmlns="" xmlns:a14="http://schemas.microsoft.com/office/drawing/2010/main" val="0"/>
               </a:ext>
             </a:extLst>
           </a:blip>
@@ -11060,7 +11085,7 @@
           <a:noFill/>
           <a:extLst>
             <a:ext uri="{909E8E84-426E-40DD-AFC4-6F175D3DCCD1}">
-              <a14:hiddenFill xmlns:a14="http://schemas.microsoft.com/office/drawing/2010/main">
+              <a14:hiddenFill xmlns="" xmlns:a14="http://schemas.microsoft.com/office/drawing/2010/main">
                 <a:solidFill>
                   <a:srgbClr val="FFFFFF"/>
                 </a:solidFill>
@@ -11076,7 +11101,7 @@
           <p:nvPr>
             <p:extLst>
               <p:ext uri="{D42A27DB-BD31-4B8C-83A1-F6EECF244321}">
-                <p14:modId xmlns:p14="http://schemas.microsoft.com/office/powerpoint/2010/main" val="1566534675"/>
+                <p14:modId xmlns="" xmlns:p14="http://schemas.microsoft.com/office/powerpoint/2010/main" val="1566534675"/>
               </p:ext>
             </p:extLst>
           </p:nvPr>
@@ -11420,11 +11445,7 @@
               </a:pPr>
               <a:r>
                 <a:rPr lang="en-US" sz="1600" kern="1200" dirty="0" smtClean="0"/>
-                <a:t>   Phase </a:t>
-              </a:r>
-              <a:r>
-                <a:rPr lang="en-US" sz="1600" kern="1200" dirty="0" smtClean="0"/>
-                <a:t>4</a:t>
+                <a:t>   Phase 4</a:t>
               </a:r>
             </a:p>
             <a:p>
@@ -11460,7 +11481,7 @@
           <p:nvPr/>
         </p:nvPicPr>
         <p:blipFill>
-          <a:blip r:embed="rId9"/>
+          <a:blip r:embed="rId8"/>
           <a:stretch>
             <a:fillRect/>
           </a:stretch>
@@ -11491,7 +11512,7 @@
     </p:spTree>
     <p:extLst>
       <p:ext uri="{BB962C8B-B14F-4D97-AF65-F5344CB8AC3E}">
-        <p14:creationId xmlns:p14="http://schemas.microsoft.com/office/powerpoint/2010/main" val="843845998"/>
+        <p14:creationId xmlns="" xmlns:p14="http://schemas.microsoft.com/office/powerpoint/2010/main" val="843845998"/>
       </p:ext>
     </p:extLst>
   </p:cSld>
@@ -11596,6 +11617,7 @@
           <a:p>
             <a:fld id="{750FFBE5-4B2F-4234-A7E0-04D60560B238}" type="slidenum">
               <a:rPr lang="en-US" smtClean="0"/>
+              <a:pPr/>
               <a:t>11</a:t>
             </a:fld>
             <a:endParaRPr lang="en-US" dirty="0"/>
@@ -11637,7 +11659,7 @@
           <a:blip r:embed="rId3">
             <a:extLst>
               <a:ext uri="{28A0092B-C50C-407E-A947-70E740481C1C}">
-                <a14:useLocalDpi xmlns:a14="http://schemas.microsoft.com/office/drawing/2010/main" val="0"/>
+                <a14:useLocalDpi xmlns="" xmlns:a14="http://schemas.microsoft.com/office/drawing/2010/main" val="0"/>
               </a:ext>
             </a:extLst>
           </a:blip>
@@ -11657,7 +11679,7 @@
           <a:noFill/>
           <a:extLst>
             <a:ext uri="{909E8E84-426E-40DD-AFC4-6F175D3DCCD1}">
-              <a14:hiddenFill xmlns:a14="http://schemas.microsoft.com/office/drawing/2010/main">
+              <a14:hiddenFill xmlns="" xmlns:a14="http://schemas.microsoft.com/office/drawing/2010/main">
                 <a:solidFill>
                   <a:srgbClr val="FFFFFF"/>
                 </a:solidFill>
@@ -11703,7 +11725,7 @@
     </p:spTree>
     <p:extLst>
       <p:ext uri="{BB962C8B-B14F-4D97-AF65-F5344CB8AC3E}">
-        <p14:creationId xmlns:p14="http://schemas.microsoft.com/office/powerpoint/2010/main" val="4274902367"/>
+        <p14:creationId xmlns="" xmlns:p14="http://schemas.microsoft.com/office/powerpoint/2010/main" val="4274902367"/>
       </p:ext>
     </p:extLst>
   </p:cSld>
@@ -11819,6 +11841,7 @@
           <a:p>
             <a:fld id="{750FFBE5-4B2F-4234-A7E0-04D60560B238}" type="slidenum">
               <a:rPr lang="en-US" smtClean="0"/>
+              <a:pPr/>
               <a:t>12</a:t>
             </a:fld>
             <a:endParaRPr lang="en-US" dirty="0"/>
@@ -11837,7 +11860,7 @@
           <a:blip r:embed="rId3">
             <a:extLst>
               <a:ext uri="{28A0092B-C50C-407E-A947-70E740481C1C}">
-                <a14:useLocalDpi xmlns:a14="http://schemas.microsoft.com/office/drawing/2010/main" val="0"/>
+                <a14:useLocalDpi xmlns="" xmlns:a14="http://schemas.microsoft.com/office/drawing/2010/main" val="0"/>
               </a:ext>
             </a:extLst>
           </a:blip>
@@ -11857,7 +11880,7 @@
           <a:noFill/>
           <a:extLst>
             <a:ext uri="{909E8E84-426E-40DD-AFC4-6F175D3DCCD1}">
-              <a14:hiddenFill xmlns:a14="http://schemas.microsoft.com/office/drawing/2010/main">
+              <a14:hiddenFill xmlns="" xmlns:a14="http://schemas.microsoft.com/office/drawing/2010/main">
                 <a:solidFill>
                   <a:srgbClr val="FFFFFF"/>
                 </a:solidFill>
@@ -11942,7 +11965,7 @@
     </p:spTree>
     <p:extLst>
       <p:ext uri="{BB962C8B-B14F-4D97-AF65-F5344CB8AC3E}">
-        <p14:creationId xmlns:p14="http://schemas.microsoft.com/office/powerpoint/2010/main" val="2900096528"/>
+        <p14:creationId xmlns="" xmlns:p14="http://schemas.microsoft.com/office/powerpoint/2010/main" val="2900096528"/>
       </p:ext>
     </p:extLst>
   </p:cSld>
@@ -12056,6 +12079,7 @@
           <a:p>
             <a:fld id="{750FFBE5-4B2F-4234-A7E0-04D60560B238}" type="slidenum">
               <a:rPr lang="en-US" smtClean="0"/>
+              <a:pPr/>
               <a:t>13</a:t>
             </a:fld>
             <a:endParaRPr lang="en-US"/>
@@ -12074,7 +12098,7 @@
           <a:blip r:embed="rId2">
             <a:extLst>
               <a:ext uri="{28A0092B-C50C-407E-A947-70E740481C1C}">
-                <a14:useLocalDpi xmlns:a14="http://schemas.microsoft.com/office/drawing/2010/main" val="0"/>
+                <a14:useLocalDpi xmlns="" xmlns:a14="http://schemas.microsoft.com/office/drawing/2010/main" val="0"/>
               </a:ext>
             </a:extLst>
           </a:blip>
@@ -12094,7 +12118,7 @@
           <a:noFill/>
           <a:extLst>
             <a:ext uri="{909E8E84-426E-40DD-AFC4-6F175D3DCCD1}">
-              <a14:hiddenFill xmlns:a14="http://schemas.microsoft.com/office/drawing/2010/main">
+              <a14:hiddenFill xmlns="" xmlns:a14="http://schemas.microsoft.com/office/drawing/2010/main">
                 <a:solidFill>
                   <a:srgbClr val="FFFFFF"/>
                 </a:solidFill>
@@ -12106,7 +12130,7 @@
     </p:spTree>
     <p:extLst>
       <p:ext uri="{BB962C8B-B14F-4D97-AF65-F5344CB8AC3E}">
-        <p14:creationId xmlns:p14="http://schemas.microsoft.com/office/powerpoint/2010/main" val="1913014469"/>
+        <p14:creationId xmlns="" xmlns:p14="http://schemas.microsoft.com/office/powerpoint/2010/main" val="1913014469"/>
       </p:ext>
     </p:extLst>
   </p:cSld>
@@ -12493,6 +12517,7 @@
           <a:p>
             <a:fld id="{750FFBE5-4B2F-4234-A7E0-04D60560B238}" type="slidenum">
               <a:rPr lang="en-US" smtClean="0"/>
+              <a:pPr/>
               <a:t>2</a:t>
             </a:fld>
             <a:endParaRPr lang="en-US"/>
@@ -12511,7 +12536,7 @@
           <a:blip r:embed="rId2">
             <a:extLst>
               <a:ext uri="{28A0092B-C50C-407E-A947-70E740481C1C}">
-                <a14:useLocalDpi xmlns:a14="http://schemas.microsoft.com/office/drawing/2010/main" val="0"/>
+                <a14:useLocalDpi xmlns="" xmlns:a14="http://schemas.microsoft.com/office/drawing/2010/main" val="0"/>
               </a:ext>
             </a:extLst>
           </a:blip>
@@ -12531,7 +12556,7 @@
           <a:noFill/>
           <a:extLst>
             <a:ext uri="{909E8E84-426E-40DD-AFC4-6F175D3DCCD1}">
-              <a14:hiddenFill xmlns:a14="http://schemas.microsoft.com/office/drawing/2010/main">
+              <a14:hiddenFill xmlns="" xmlns:a14="http://schemas.microsoft.com/office/drawing/2010/main">
                 <a:solidFill>
                   <a:srgbClr val="FFFFFF"/>
                 </a:solidFill>
@@ -12571,7 +12596,7 @@
     </p:spTree>
     <p:extLst>
       <p:ext uri="{BB962C8B-B14F-4D97-AF65-F5344CB8AC3E}">
-        <p14:creationId xmlns:p14="http://schemas.microsoft.com/office/powerpoint/2010/main" val="4096546165"/>
+        <p14:creationId xmlns="" xmlns:p14="http://schemas.microsoft.com/office/powerpoint/2010/main" val="4096546165"/>
       </p:ext>
     </p:extLst>
   </p:cSld>
@@ -12733,15 +12758,7 @@
             <a:pPr lvl="2" fontAlgn="base"/>
             <a:r>
               <a:rPr lang="en-US" dirty="0" smtClean="0"/>
-              <a:t>O</a:t>
-            </a:r>
-            <a:r>
-              <a:rPr lang="en-US" dirty="0" smtClean="0"/>
-              <a:t>ptimize </a:t>
-            </a:r>
-            <a:r>
-              <a:rPr lang="en-US" dirty="0" smtClean="0"/>
-              <a:t>overall commercial performance through a unified, centralized and data-driven team approach</a:t>
+              <a:t>Optimize overall commercial performance through a unified, centralized and data-driven team approach</a:t>
             </a:r>
           </a:p>
           <a:p>
@@ -12857,6 +12874,7 @@
           <a:p>
             <a:fld id="{750FFBE5-4B2F-4234-A7E0-04D60560B238}" type="slidenum">
               <a:rPr lang="en-US" smtClean="0"/>
+              <a:pPr/>
               <a:t>3</a:t>
             </a:fld>
             <a:endParaRPr lang="en-US"/>
@@ -12898,7 +12916,7 @@
           <a:blip r:embed="rId3">
             <a:extLst>
               <a:ext uri="{28A0092B-C50C-407E-A947-70E740481C1C}">
-                <a14:useLocalDpi xmlns:a14="http://schemas.microsoft.com/office/drawing/2010/main" val="0"/>
+                <a14:useLocalDpi xmlns="" xmlns:a14="http://schemas.microsoft.com/office/drawing/2010/main" val="0"/>
               </a:ext>
             </a:extLst>
           </a:blip>
@@ -12918,7 +12936,7 @@
           <a:noFill/>
           <a:extLst>
             <a:ext uri="{909E8E84-426E-40DD-AFC4-6F175D3DCCD1}">
-              <a14:hiddenFill xmlns:a14="http://schemas.microsoft.com/office/drawing/2010/main">
+              <a14:hiddenFill xmlns="" xmlns:a14="http://schemas.microsoft.com/office/drawing/2010/main">
                 <a:solidFill>
                   <a:srgbClr val="FFFFFF"/>
                 </a:solidFill>
@@ -12930,7 +12948,7 @@
     </p:spTree>
     <p:extLst>
       <p:ext uri="{BB962C8B-B14F-4D97-AF65-F5344CB8AC3E}">
-        <p14:creationId xmlns:p14="http://schemas.microsoft.com/office/powerpoint/2010/main" val="2187293542"/>
+        <p14:creationId xmlns="" xmlns:p14="http://schemas.microsoft.com/office/powerpoint/2010/main" val="2187293542"/>
       </p:ext>
     </p:extLst>
   </p:cSld>
@@ -13004,6 +13022,7 @@
           <a:p>
             <a:fld id="{750FFBE5-4B2F-4234-A7E0-04D60560B238}" type="slidenum">
               <a:rPr lang="en-US" smtClean="0"/>
+              <a:pPr/>
               <a:t>4</a:t>
             </a:fld>
             <a:endParaRPr lang="en-US"/>
@@ -13045,7 +13064,7 @@
           <a:blip r:embed="rId3">
             <a:extLst>
               <a:ext uri="{28A0092B-C50C-407E-A947-70E740481C1C}">
-                <a14:useLocalDpi xmlns:a14="http://schemas.microsoft.com/office/drawing/2010/main" val="0"/>
+                <a14:useLocalDpi xmlns="" xmlns:a14="http://schemas.microsoft.com/office/drawing/2010/main" val="0"/>
               </a:ext>
             </a:extLst>
           </a:blip>
@@ -13065,7 +13084,7 @@
           <a:noFill/>
           <a:extLst>
             <a:ext uri="{909E8E84-426E-40DD-AFC4-6F175D3DCCD1}">
-              <a14:hiddenFill xmlns:a14="http://schemas.microsoft.com/office/drawing/2010/main">
+              <a14:hiddenFill xmlns="" xmlns:a14="http://schemas.microsoft.com/office/drawing/2010/main">
                 <a:solidFill>
                   <a:srgbClr val="FFFFFF"/>
                 </a:solidFill>
@@ -13107,17 +13126,7 @@
                   </a:schemeClr>
                 </a:solidFill>
               </a:rPr>
-              <a:t>North Star Tool </a:t>
-            </a:r>
-            <a:r>
-              <a:rPr lang="en-US" sz="16000" b="1" dirty="0" smtClean="0">
-                <a:solidFill>
-                  <a:schemeClr val="tx2">
-                    <a:lumMod val="75000"/>
-                  </a:schemeClr>
-                </a:solidFill>
-              </a:rPr>
-              <a:t>Concept</a:t>
+              <a:t>North Star Tool Concept</a:t>
             </a:r>
           </a:p>
           <a:p>
@@ -13128,7 +13137,6 @@
               <a:rPr lang="en-US" sz="7200" dirty="0"/>
               <a:t>“We aim to Design or Equip the client with the Tool to Improve their Financial Performance (Revenue) to Thrive in the Marketplace with effective Root Planning”</a:t>
             </a:r>
-            <a:endParaRPr lang="en-US" sz="7200" dirty="0"/>
           </a:p>
         </p:txBody>
       </p:sp>
@@ -13144,7 +13152,7 @@
           <a:blip r:embed="rId4">
             <a:extLst>
               <a:ext uri="{28A0092B-C50C-407E-A947-70E740481C1C}">
-                <a14:useLocalDpi xmlns:a14="http://schemas.microsoft.com/office/drawing/2010/main" val="0"/>
+                <a14:useLocalDpi xmlns="" xmlns:a14="http://schemas.microsoft.com/office/drawing/2010/main" val="0"/>
               </a:ext>
             </a:extLst>
           </a:blip>
@@ -13347,7 +13355,7 @@
     </p:spTree>
     <p:extLst>
       <p:ext uri="{BB962C8B-B14F-4D97-AF65-F5344CB8AC3E}">
-        <p14:creationId xmlns:p14="http://schemas.microsoft.com/office/powerpoint/2010/main" val="54373068"/>
+        <p14:creationId xmlns="" xmlns:p14="http://schemas.microsoft.com/office/powerpoint/2010/main" val="54373068"/>
       </p:ext>
     </p:extLst>
   </p:cSld>
@@ -13463,6 +13471,7 @@
           <a:p>
             <a:fld id="{750FFBE5-4B2F-4234-A7E0-04D60560B238}" type="slidenum">
               <a:rPr lang="en-US" smtClean="0"/>
+              <a:pPr/>
               <a:t>5</a:t>
             </a:fld>
             <a:endParaRPr lang="en-US"/>
@@ -13504,7 +13513,7 @@
           <a:blip r:embed="rId3">
             <a:extLst>
               <a:ext uri="{28A0092B-C50C-407E-A947-70E740481C1C}">
-                <a14:useLocalDpi xmlns:a14="http://schemas.microsoft.com/office/drawing/2010/main" val="0"/>
+                <a14:useLocalDpi xmlns="" xmlns:a14="http://schemas.microsoft.com/office/drawing/2010/main" val="0"/>
               </a:ext>
             </a:extLst>
           </a:blip>
@@ -13524,7 +13533,7 @@
           <a:noFill/>
           <a:extLst>
             <a:ext uri="{909E8E84-426E-40DD-AFC4-6F175D3DCCD1}">
-              <a14:hiddenFill xmlns:a14="http://schemas.microsoft.com/office/drawing/2010/main">
+              <a14:hiddenFill xmlns="" xmlns:a14="http://schemas.microsoft.com/office/drawing/2010/main">
                 <a:solidFill>
                   <a:srgbClr val="FFFFFF"/>
                 </a:solidFill>
@@ -13543,7 +13552,7 @@
             <p:ph idx="1"/>
             <p:extLst>
               <p:ext uri="{D42A27DB-BD31-4B8C-83A1-F6EECF244321}">
-                <p14:modId xmlns:p14="http://schemas.microsoft.com/office/powerpoint/2010/main" val="40662462"/>
+                <p14:modId xmlns="" xmlns:p14="http://schemas.microsoft.com/office/powerpoint/2010/main" val="40662462"/>
               </p:ext>
             </p:extLst>
           </p:nvPr>
@@ -13949,7 +13958,7 @@
     </p:spTree>
     <p:extLst>
       <p:ext uri="{BB962C8B-B14F-4D97-AF65-F5344CB8AC3E}">
-        <p14:creationId xmlns:p14="http://schemas.microsoft.com/office/powerpoint/2010/main" val="1638366233"/>
+        <p14:creationId xmlns="" xmlns:p14="http://schemas.microsoft.com/office/powerpoint/2010/main" val="1638366233"/>
       </p:ext>
     </p:extLst>
   </p:cSld>
@@ -13993,298 +14002,6 @@
             <p:ph type="title"/>
           </p:nvPr>
         </p:nvSpPr>
-        <p:spPr/>
-        <p:txBody>
-          <a:bodyPr>
-            <a:normAutofit/>
-          </a:bodyPr>
-          <a:lstStyle/>
-          <a:p>
-            <a:r>
-              <a:rPr lang="en-US" sz="4000" b="1" dirty="0" smtClean="0">
-                <a:solidFill>
-                  <a:schemeClr val="tx2">
-                    <a:lumMod val="75000"/>
-                  </a:schemeClr>
-                </a:solidFill>
-              </a:rPr>
-              <a:t>Budget Breakdown</a:t>
-            </a:r>
-            <a:endParaRPr lang="en-US" sz="4000" b="1" dirty="0">
-              <a:solidFill>
-                <a:schemeClr val="tx2">
-                  <a:lumMod val="75000"/>
-                </a:schemeClr>
-              </a:solidFill>
-            </a:endParaRPr>
-          </a:p>
-        </p:txBody>
-      </p:sp>
-      <p:sp>
-        <p:nvSpPr>
-          <p:cNvPr id="3" name="Content Placeholder 2"/>
-          <p:cNvSpPr>
-            <a:spLocks noGrp="1"/>
-          </p:cNvSpPr>
-          <p:nvPr>
-            <p:ph idx="1"/>
-          </p:nvPr>
-        </p:nvSpPr>
-        <p:spPr>
-          <a:ln>
-            <a:noFill/>
-          </a:ln>
-          <a:effectLst>
-            <a:outerShdw blurRad="190500" dist="228600" dir="2700000" algn="ctr">
-              <a:srgbClr val="000000">
-                <a:alpha val="30000"/>
-              </a:srgbClr>
-            </a:outerShdw>
-          </a:effectLst>
-          <a:scene3d>
-            <a:camera prst="orthographicFront">
-              <a:rot lat="0" lon="0" rev="0"/>
-            </a:camera>
-            <a:lightRig rig="glow" dir="t">
-              <a:rot lat="0" lon="0" rev="4800000"/>
-            </a:lightRig>
-          </a:scene3d>
-          <a:sp3d prstMaterial="matte">
-            <a:bevelT w="127000" h="63500"/>
-          </a:sp3d>
-        </p:spPr>
-        <p:txBody>
-          <a:bodyPr/>
-          <a:lstStyle/>
-          <a:p>
-            <a:endParaRPr lang="en-US" dirty="0"/>
-          </a:p>
-        </p:txBody>
-      </p:sp>
-      <p:sp>
-        <p:nvSpPr>
-          <p:cNvPr id="4" name="Date Placeholder 3"/>
-          <p:cNvSpPr>
-            <a:spLocks noGrp="1"/>
-          </p:cNvSpPr>
-          <p:nvPr>
-            <p:ph type="dt" sz="half" idx="10"/>
-          </p:nvPr>
-        </p:nvSpPr>
-        <p:spPr/>
-        <p:txBody>
-          <a:bodyPr/>
-          <a:lstStyle/>
-          <a:p>
-            <a:r>
-              <a:rPr lang="en-US" smtClean="0"/>
-              <a:t>12/21/2022</a:t>
-            </a:r>
-            <a:endParaRPr lang="en-US"/>
-          </a:p>
-        </p:txBody>
-      </p:sp>
-      <p:sp>
-        <p:nvSpPr>
-          <p:cNvPr id="5" name="Slide Number Placeholder 4"/>
-          <p:cNvSpPr>
-            <a:spLocks noGrp="1"/>
-          </p:cNvSpPr>
-          <p:nvPr>
-            <p:ph type="sldNum" sz="quarter" idx="12"/>
-          </p:nvPr>
-        </p:nvSpPr>
-        <p:spPr/>
-        <p:txBody>
-          <a:bodyPr/>
-          <a:lstStyle/>
-          <a:p>
-            <a:fld id="{750FFBE5-4B2F-4234-A7E0-04D60560B238}" type="slidenum">
-              <a:rPr lang="en-US" smtClean="0"/>
-              <a:t>6</a:t>
-            </a:fld>
-            <a:endParaRPr lang="en-US" dirty="0"/>
-          </a:p>
-        </p:txBody>
-      </p:sp>
-      <p:pic>
-        <p:nvPicPr>
-          <p:cNvPr id="13314" name="Picture 2" descr="https://lh6.googleusercontent.com/4uA4HhER7LysZTcOMDD3Z2ef5sZx1qwJxTLJZ2kmdgAcscZXdb9ljesC2JTdKo62SstnemjzBX6H0b149_zLO5T7HT1lkVFOrB0nxhHTyDzVhgaKyAjjIJHWaOkxzmw2Gg01NEL3n6wMp1QWkiBrgY9gq38IEwTsPhVM43QV1yNYcKHeO6WA87F3FsS88iv9=s2048"/>
-          <p:cNvPicPr>
-            <a:picLocks noChangeAspect="1" noChangeArrowheads="1"/>
-          </p:cNvPicPr>
-          <p:nvPr/>
-        </p:nvPicPr>
-        <p:blipFill>
-          <a:blip r:embed="rId2">
-            <a:extLst>
-              <a:ext uri="{28A0092B-C50C-407E-A947-70E740481C1C}">
-                <a14:useLocalDpi xmlns:a14="http://schemas.microsoft.com/office/drawing/2010/main" val="0"/>
-              </a:ext>
-            </a:extLst>
-          </a:blip>
-          <a:srcRect/>
-          <a:stretch>
-            <a:fillRect/>
-          </a:stretch>
-        </p:blipFill>
-        <p:spPr bwMode="auto">
-          <a:xfrm>
-            <a:off x="942975" y="1870075"/>
-            <a:ext cx="8143875" cy="3829051"/>
-          </a:xfrm>
-          <a:prstGeom prst="rect">
-            <a:avLst/>
-          </a:prstGeom>
-          <a:noFill/>
-          <a:ln>
-            <a:noFill/>
-          </a:ln>
-          <a:effectLst>
-            <a:outerShdw blurRad="190500" dist="228600" dir="2700000" algn="ctr">
-              <a:srgbClr val="000000">
-                <a:alpha val="30000"/>
-              </a:srgbClr>
-            </a:outerShdw>
-          </a:effectLst>
-          <a:scene3d>
-            <a:camera prst="orthographicFront">
-              <a:rot lat="0" lon="0" rev="0"/>
-            </a:camera>
-            <a:lightRig rig="glow" dir="t">
-              <a:rot lat="0" lon="0" rev="4800000"/>
-            </a:lightRig>
-          </a:scene3d>
-          <a:sp3d prstMaterial="matte">
-            <a:bevelT w="127000" h="63500"/>
-          </a:sp3d>
-          <a:extLst>
-            <a:ext uri="{909E8E84-426E-40DD-AFC4-6F175D3DCCD1}">
-              <a14:hiddenFill xmlns:a14="http://schemas.microsoft.com/office/drawing/2010/main">
-                <a:solidFill>
-                  <a:srgbClr val="FFFFFF"/>
-                </a:solidFill>
-              </a14:hiddenFill>
-            </a:ext>
-          </a:extLst>
-        </p:spPr>
-      </p:pic>
-      <p:pic>
-        <p:nvPicPr>
-          <p:cNvPr id="7" name="Picture 6" descr="https://lh3.googleusercontent.com/_EfMoIJxTZl6lbhVKykv0k1Gnesmv2jfyYP_K1Y8kifVnZuTxlF2d3Te3J80x_IFMstRtM8LxXY-pGzDo_CB3tacri_oQhv-qtr3mjpFIvuddHBbgsEEEwQ7cuD_iV488vlT9obGL9Fvoah_i9J7jeZxG3RaGfkZ0QfT-kv5emcuRkuUt7SJynvyVobiH2Gr=s2048"/>
-          <p:cNvPicPr>
-            <a:picLocks noChangeAspect="1" noChangeArrowheads="1"/>
-          </p:cNvPicPr>
-          <p:nvPr/>
-        </p:nvPicPr>
-        <p:blipFill>
-          <a:blip r:embed="rId3">
-            <a:extLst>
-              <a:ext uri="{28A0092B-C50C-407E-A947-70E740481C1C}">
-                <a14:useLocalDpi xmlns:a14="http://schemas.microsoft.com/office/drawing/2010/main" val="0"/>
-              </a:ext>
-            </a:extLst>
-          </a:blip>
-          <a:srcRect/>
-          <a:stretch>
-            <a:fillRect/>
-          </a:stretch>
-        </p:blipFill>
-        <p:spPr bwMode="auto">
-          <a:xfrm>
-            <a:off x="10934700" y="33338"/>
-            <a:ext cx="1257300" cy="706583"/>
-          </a:xfrm>
-          <a:prstGeom prst="rect">
-            <a:avLst/>
-          </a:prstGeom>
-          <a:noFill/>
-          <a:extLst>
-            <a:ext uri="{909E8E84-426E-40DD-AFC4-6F175D3DCCD1}">
-              <a14:hiddenFill xmlns:a14="http://schemas.microsoft.com/office/drawing/2010/main">
-                <a:solidFill>
-                  <a:srgbClr val="FFFFFF"/>
-                </a:solidFill>
-              </a14:hiddenFill>
-            </a:ext>
-          </a:extLst>
-        </p:spPr>
-      </p:pic>
-      <p:sp>
-        <p:nvSpPr>
-          <p:cNvPr id="8" name="Footer Placeholder 5"/>
-          <p:cNvSpPr>
-            <a:spLocks noGrp="1"/>
-          </p:cNvSpPr>
-          <p:nvPr>
-            <p:ph type="ftr" sz="quarter" idx="11"/>
-          </p:nvPr>
-        </p:nvSpPr>
-        <p:spPr>
-          <a:xfrm>
-            <a:off x="4038600" y="6356350"/>
-            <a:ext cx="4114800" cy="365125"/>
-          </a:xfrm>
-        </p:spPr>
-        <p:txBody>
-          <a:bodyPr/>
-          <a:lstStyle/>
-          <a:p>
-            <a:r>
-              <a:rPr lang="en-US" dirty="0" smtClean="0"/>
-              <a:t>Budget Breakdown</a:t>
-            </a:r>
-            <a:endParaRPr lang="en-US" dirty="0"/>
-          </a:p>
-        </p:txBody>
-      </p:sp>
-    </p:spTree>
-    <p:extLst>
-      <p:ext uri="{BB962C8B-B14F-4D97-AF65-F5344CB8AC3E}">
-        <p14:creationId xmlns:p14="http://schemas.microsoft.com/office/powerpoint/2010/main" val="4283641924"/>
-      </p:ext>
-    </p:extLst>
-  </p:cSld>
-  <p:clrMapOvr>
-    <a:masterClrMapping/>
-  </p:clrMapOvr>
-  <p:timing>
-    <p:tnLst>
-      <p:par>
-        <p:cTn id="1" dur="indefinite" restart="never" nodeType="tmRoot"/>
-      </p:par>
-    </p:tnLst>
-  </p:timing>
-</p:sld>
-</file>
-
-<file path=ppt/slides/slide7.xml><?xml version="1.0" encoding="utf-8"?>
-<p:sld xmlns:a="http://schemas.openxmlformats.org/drawingml/2006/main" xmlns:r="http://schemas.openxmlformats.org/officeDocument/2006/relationships" xmlns:p="http://schemas.openxmlformats.org/presentationml/2006/main">
-  <p:cSld>
-    <p:spTree>
-      <p:nvGrpSpPr>
-        <p:cNvPr id="1" name=""/>
-        <p:cNvGrpSpPr/>
-        <p:nvPr/>
-      </p:nvGrpSpPr>
-      <p:grpSpPr>
-        <a:xfrm>
-          <a:off x="0" y="0"/>
-          <a:ext cx="0" cy="0"/>
-          <a:chOff x="0" y="0"/>
-          <a:chExt cx="0" cy="0"/>
-        </a:xfrm>
-      </p:grpSpPr>
-      <p:sp>
-        <p:nvSpPr>
-          <p:cNvPr id="2" name="Title 1"/>
-          <p:cNvSpPr>
-            <a:spLocks noGrp="1"/>
-          </p:cNvSpPr>
-          <p:nvPr>
-            <p:ph type="title"/>
-          </p:nvPr>
-        </p:nvSpPr>
         <p:spPr>
           <a:xfrm>
             <a:off x="838200" y="365125"/>
@@ -14363,7 +14080,8 @@
           <a:p>
             <a:fld id="{750FFBE5-4B2F-4234-A7E0-04D60560B238}" type="slidenum">
               <a:rPr lang="en-US" smtClean="0"/>
-              <a:t>7</a:t>
+              <a:pPr/>
+              <a:t>6</a:t>
             </a:fld>
             <a:endParaRPr lang="en-US" dirty="0"/>
           </a:p>
@@ -14409,7 +14127,7 @@
           <a:blip r:embed="rId3">
             <a:extLst>
               <a:ext uri="{28A0092B-C50C-407E-A947-70E740481C1C}">
-                <a14:useLocalDpi xmlns:a14="http://schemas.microsoft.com/office/drawing/2010/main" val="0"/>
+                <a14:useLocalDpi xmlns="" xmlns:a14="http://schemas.microsoft.com/office/drawing/2010/main" val="0"/>
               </a:ext>
             </a:extLst>
           </a:blip>
@@ -14429,7 +14147,7 @@
           <a:noFill/>
           <a:extLst>
             <a:ext uri="{909E8E84-426E-40DD-AFC4-6F175D3DCCD1}">
-              <a14:hiddenFill xmlns:a14="http://schemas.microsoft.com/office/drawing/2010/main">
+              <a14:hiddenFill xmlns="" xmlns:a14="http://schemas.microsoft.com/office/drawing/2010/main">
                 <a:solidFill>
                   <a:srgbClr val="FFFFFF"/>
                 </a:solidFill>
@@ -14512,7 +14230,7 @@
           <a:blip r:embed="rId4">
             <a:extLst>
               <a:ext uri="{28A0092B-C50C-407E-A947-70E740481C1C}">
-                <a14:useLocalDpi xmlns:a14="http://schemas.microsoft.com/office/drawing/2010/main" val="0"/>
+                <a14:useLocalDpi xmlns="" xmlns:a14="http://schemas.microsoft.com/office/drawing/2010/main" val="0"/>
               </a:ext>
             </a:extLst>
           </a:blip>
@@ -14530,7 +14248,7 @@
           <a:noFill/>
           <a:extLst>
             <a:ext uri="{909E8E84-426E-40DD-AFC4-6F175D3DCCD1}">
-              <a14:hiddenFill xmlns:a14="http://schemas.microsoft.com/office/drawing/2010/main">
+              <a14:hiddenFill xmlns="" xmlns:a14="http://schemas.microsoft.com/office/drawing/2010/main">
                 <a:solidFill>
                   <a:srgbClr val="FFFFFF"/>
                 </a:solidFill>
@@ -14743,7 +14461,300 @@
     </p:spTree>
     <p:extLst>
       <p:ext uri="{BB962C8B-B14F-4D97-AF65-F5344CB8AC3E}">
-        <p14:creationId xmlns:p14="http://schemas.microsoft.com/office/powerpoint/2010/main" val="1904412390"/>
+        <p14:creationId xmlns="" xmlns:p14="http://schemas.microsoft.com/office/powerpoint/2010/main" val="1904412390"/>
+      </p:ext>
+    </p:extLst>
+  </p:cSld>
+  <p:clrMapOvr>
+    <a:masterClrMapping/>
+  </p:clrMapOvr>
+  <p:timing>
+    <p:tnLst>
+      <p:par>
+        <p:cTn id="1" dur="indefinite" restart="never" nodeType="tmRoot"/>
+      </p:par>
+    </p:tnLst>
+  </p:timing>
+</p:sld>
+</file>
+
+<file path=ppt/slides/slide7.xml><?xml version="1.0" encoding="utf-8"?>
+<p:sld xmlns:a="http://schemas.openxmlformats.org/drawingml/2006/main" xmlns:r="http://schemas.openxmlformats.org/officeDocument/2006/relationships" xmlns:p="http://schemas.openxmlformats.org/presentationml/2006/main">
+  <p:cSld>
+    <p:spTree>
+      <p:nvGrpSpPr>
+        <p:cNvPr id="1" name=""/>
+        <p:cNvGrpSpPr/>
+        <p:nvPr/>
+      </p:nvGrpSpPr>
+      <p:grpSpPr>
+        <a:xfrm>
+          <a:off x="0" y="0"/>
+          <a:ext cx="0" cy="0"/>
+          <a:chOff x="0" y="0"/>
+          <a:chExt cx="0" cy="0"/>
+        </a:xfrm>
+      </p:grpSpPr>
+      <p:sp>
+        <p:nvSpPr>
+          <p:cNvPr id="2" name="Title 1"/>
+          <p:cNvSpPr>
+            <a:spLocks noGrp="1"/>
+          </p:cNvSpPr>
+          <p:nvPr>
+            <p:ph type="title"/>
+          </p:nvPr>
+        </p:nvSpPr>
+        <p:spPr/>
+        <p:txBody>
+          <a:bodyPr>
+            <a:normAutofit/>
+          </a:bodyPr>
+          <a:lstStyle/>
+          <a:p>
+            <a:r>
+              <a:rPr lang="en-US" sz="4000" b="1" dirty="0" smtClean="0">
+                <a:solidFill>
+                  <a:schemeClr val="tx2">
+                    <a:lumMod val="75000"/>
+                  </a:schemeClr>
+                </a:solidFill>
+              </a:rPr>
+              <a:t>Budget Breakdown</a:t>
+            </a:r>
+            <a:endParaRPr lang="en-US" sz="4000" b="1" dirty="0">
+              <a:solidFill>
+                <a:schemeClr val="tx2">
+                  <a:lumMod val="75000"/>
+                </a:schemeClr>
+              </a:solidFill>
+            </a:endParaRPr>
+          </a:p>
+        </p:txBody>
+      </p:sp>
+      <p:sp>
+        <p:nvSpPr>
+          <p:cNvPr id="3" name="Content Placeholder 2"/>
+          <p:cNvSpPr>
+            <a:spLocks noGrp="1"/>
+          </p:cNvSpPr>
+          <p:nvPr>
+            <p:ph idx="1"/>
+          </p:nvPr>
+        </p:nvSpPr>
+        <p:spPr>
+          <a:ln>
+            <a:noFill/>
+          </a:ln>
+          <a:effectLst>
+            <a:outerShdw blurRad="190500" dist="228600" dir="2700000" algn="ctr">
+              <a:srgbClr val="000000">
+                <a:alpha val="30000"/>
+              </a:srgbClr>
+            </a:outerShdw>
+          </a:effectLst>
+          <a:scene3d>
+            <a:camera prst="orthographicFront">
+              <a:rot lat="0" lon="0" rev="0"/>
+            </a:camera>
+            <a:lightRig rig="glow" dir="t">
+              <a:rot lat="0" lon="0" rev="4800000"/>
+            </a:lightRig>
+          </a:scene3d>
+          <a:sp3d prstMaterial="matte">
+            <a:bevelT w="127000" h="63500"/>
+          </a:sp3d>
+        </p:spPr>
+        <p:txBody>
+          <a:bodyPr/>
+          <a:lstStyle/>
+          <a:p>
+            <a:endParaRPr lang="en-US" dirty="0"/>
+          </a:p>
+        </p:txBody>
+      </p:sp>
+      <p:sp>
+        <p:nvSpPr>
+          <p:cNvPr id="4" name="Date Placeholder 3"/>
+          <p:cNvSpPr>
+            <a:spLocks noGrp="1"/>
+          </p:cNvSpPr>
+          <p:nvPr>
+            <p:ph type="dt" sz="half" idx="10"/>
+          </p:nvPr>
+        </p:nvSpPr>
+        <p:spPr/>
+        <p:txBody>
+          <a:bodyPr/>
+          <a:lstStyle/>
+          <a:p>
+            <a:r>
+              <a:rPr lang="en-US" smtClean="0"/>
+              <a:t>12/21/2022</a:t>
+            </a:r>
+            <a:endParaRPr lang="en-US"/>
+          </a:p>
+        </p:txBody>
+      </p:sp>
+      <p:sp>
+        <p:nvSpPr>
+          <p:cNvPr id="5" name="Slide Number Placeholder 4"/>
+          <p:cNvSpPr>
+            <a:spLocks noGrp="1"/>
+          </p:cNvSpPr>
+          <p:nvPr>
+            <p:ph type="sldNum" sz="quarter" idx="12"/>
+          </p:nvPr>
+        </p:nvSpPr>
+        <p:spPr/>
+        <p:txBody>
+          <a:bodyPr/>
+          <a:lstStyle/>
+          <a:p>
+            <a:fld id="{750FFBE5-4B2F-4234-A7E0-04D60560B238}" type="slidenum">
+              <a:rPr lang="en-US" smtClean="0"/>
+              <a:pPr/>
+              <a:t>7</a:t>
+            </a:fld>
+            <a:endParaRPr lang="en-US" dirty="0"/>
+          </a:p>
+        </p:txBody>
+      </p:sp>
+      <p:pic>
+        <p:nvPicPr>
+          <p:cNvPr id="13314" name="Picture 2" descr="https://lh6.googleusercontent.com/4uA4HhER7LysZTcOMDD3Z2ef5sZx1qwJxTLJZ2kmdgAcscZXdb9ljesC2JTdKo62SstnemjzBX6H0b149_zLO5T7HT1lkVFOrB0nxhHTyDzVhgaKyAjjIJHWaOkxzmw2Gg01NEL3n6wMp1QWkiBrgY9gq38IEwTsPhVM43QV1yNYcKHeO6WA87F3FsS88iv9=s2048"/>
+          <p:cNvPicPr>
+            <a:picLocks noChangeAspect="1" noChangeArrowheads="1"/>
+          </p:cNvPicPr>
+          <p:nvPr/>
+        </p:nvPicPr>
+        <p:blipFill>
+          <a:blip r:embed="rId2">
+            <a:extLst>
+              <a:ext uri="{28A0092B-C50C-407E-A947-70E740481C1C}">
+                <a14:useLocalDpi xmlns="" xmlns:a14="http://schemas.microsoft.com/office/drawing/2010/main" val="0"/>
+              </a:ext>
+            </a:extLst>
+          </a:blip>
+          <a:srcRect/>
+          <a:stretch>
+            <a:fillRect/>
+          </a:stretch>
+        </p:blipFill>
+        <p:spPr bwMode="auto">
+          <a:xfrm>
+            <a:off x="942975" y="1870075"/>
+            <a:ext cx="8143875" cy="3829051"/>
+          </a:xfrm>
+          <a:prstGeom prst="rect">
+            <a:avLst/>
+          </a:prstGeom>
+          <a:noFill/>
+          <a:ln>
+            <a:noFill/>
+          </a:ln>
+          <a:effectLst>
+            <a:outerShdw blurRad="190500" dist="228600" dir="2700000" algn="ctr">
+              <a:srgbClr val="000000">
+                <a:alpha val="30000"/>
+              </a:srgbClr>
+            </a:outerShdw>
+          </a:effectLst>
+          <a:scene3d>
+            <a:camera prst="orthographicFront">
+              <a:rot lat="0" lon="0" rev="0"/>
+            </a:camera>
+            <a:lightRig rig="glow" dir="t">
+              <a:rot lat="0" lon="0" rev="4800000"/>
+            </a:lightRig>
+          </a:scene3d>
+          <a:sp3d prstMaterial="matte">
+            <a:bevelT w="127000" h="63500"/>
+          </a:sp3d>
+          <a:extLst>
+            <a:ext uri="{909E8E84-426E-40DD-AFC4-6F175D3DCCD1}">
+              <a14:hiddenFill xmlns="" xmlns:a14="http://schemas.microsoft.com/office/drawing/2010/main">
+                <a:solidFill>
+                  <a:srgbClr val="FFFFFF"/>
+                </a:solidFill>
+              </a14:hiddenFill>
+            </a:ext>
+          </a:extLst>
+        </p:spPr>
+      </p:pic>
+      <p:pic>
+        <p:nvPicPr>
+          <p:cNvPr id="7" name="Picture 6" descr="https://lh3.googleusercontent.com/_EfMoIJxTZl6lbhVKykv0k1Gnesmv2jfyYP_K1Y8kifVnZuTxlF2d3Te3J80x_IFMstRtM8LxXY-pGzDo_CB3tacri_oQhv-qtr3mjpFIvuddHBbgsEEEwQ7cuD_iV488vlT9obGL9Fvoah_i9J7jeZxG3RaGfkZ0QfT-kv5emcuRkuUt7SJynvyVobiH2Gr=s2048"/>
+          <p:cNvPicPr>
+            <a:picLocks noChangeAspect="1" noChangeArrowheads="1"/>
+          </p:cNvPicPr>
+          <p:nvPr/>
+        </p:nvPicPr>
+        <p:blipFill>
+          <a:blip r:embed="rId3">
+            <a:extLst>
+              <a:ext uri="{28A0092B-C50C-407E-A947-70E740481C1C}">
+                <a14:useLocalDpi xmlns="" xmlns:a14="http://schemas.microsoft.com/office/drawing/2010/main" val="0"/>
+              </a:ext>
+            </a:extLst>
+          </a:blip>
+          <a:srcRect/>
+          <a:stretch>
+            <a:fillRect/>
+          </a:stretch>
+        </p:blipFill>
+        <p:spPr bwMode="auto">
+          <a:xfrm>
+            <a:off x="10934700" y="33338"/>
+            <a:ext cx="1257300" cy="706583"/>
+          </a:xfrm>
+          <a:prstGeom prst="rect">
+            <a:avLst/>
+          </a:prstGeom>
+          <a:noFill/>
+          <a:extLst>
+            <a:ext uri="{909E8E84-426E-40DD-AFC4-6F175D3DCCD1}">
+              <a14:hiddenFill xmlns="" xmlns:a14="http://schemas.microsoft.com/office/drawing/2010/main">
+                <a:solidFill>
+                  <a:srgbClr val="FFFFFF"/>
+                </a:solidFill>
+              </a14:hiddenFill>
+            </a:ext>
+          </a:extLst>
+        </p:spPr>
+      </p:pic>
+      <p:sp>
+        <p:nvSpPr>
+          <p:cNvPr id="8" name="Footer Placeholder 5"/>
+          <p:cNvSpPr>
+            <a:spLocks noGrp="1"/>
+          </p:cNvSpPr>
+          <p:nvPr>
+            <p:ph type="ftr" sz="quarter" idx="11"/>
+          </p:nvPr>
+        </p:nvSpPr>
+        <p:spPr>
+          <a:xfrm>
+            <a:off x="4038600" y="6356350"/>
+            <a:ext cx="4114800" cy="365125"/>
+          </a:xfrm>
+        </p:spPr>
+        <p:txBody>
+          <a:bodyPr/>
+          <a:lstStyle/>
+          <a:p>
+            <a:r>
+              <a:rPr lang="en-US" dirty="0" smtClean="0"/>
+              <a:t>Budget Breakdown</a:t>
+            </a:r>
+            <a:endParaRPr lang="en-US" dirty="0"/>
+          </a:p>
+        </p:txBody>
+      </p:sp>
+    </p:spTree>
+    <p:extLst>
+      <p:ext uri="{BB962C8B-B14F-4D97-AF65-F5344CB8AC3E}">
+        <p14:creationId xmlns="" xmlns:p14="http://schemas.microsoft.com/office/powerpoint/2010/main" val="4283641924"/>
       </p:ext>
     </p:extLst>
   </p:cSld>
@@ -14859,6 +14870,7 @@
           <a:p>
             <a:fld id="{750FFBE5-4B2F-4234-A7E0-04D60560B238}" type="slidenum">
               <a:rPr lang="en-US" smtClean="0"/>
+              <a:pPr/>
               <a:t>8</a:t>
             </a:fld>
             <a:endParaRPr lang="en-US" dirty="0"/>
@@ -14900,7 +14912,7 @@
           <a:blip r:embed="rId3">
             <a:extLst>
               <a:ext uri="{28A0092B-C50C-407E-A947-70E740481C1C}">
-                <a14:useLocalDpi xmlns:a14="http://schemas.microsoft.com/office/drawing/2010/main" val="0"/>
+                <a14:useLocalDpi xmlns="" xmlns:a14="http://schemas.microsoft.com/office/drawing/2010/main" val="0"/>
               </a:ext>
             </a:extLst>
           </a:blip>
@@ -14920,7 +14932,7 @@
           <a:noFill/>
           <a:extLst>
             <a:ext uri="{909E8E84-426E-40DD-AFC4-6F175D3DCCD1}">
-              <a14:hiddenFill xmlns:a14="http://schemas.microsoft.com/office/drawing/2010/main">
+              <a14:hiddenFill xmlns="" xmlns:a14="http://schemas.microsoft.com/office/drawing/2010/main">
                 <a:solidFill>
                   <a:srgbClr val="FFFFFF"/>
                 </a:solidFill>
@@ -14966,7 +14978,7 @@
     </p:spTree>
     <p:extLst>
       <p:ext uri="{BB962C8B-B14F-4D97-AF65-F5344CB8AC3E}">
-        <p14:creationId xmlns:p14="http://schemas.microsoft.com/office/powerpoint/2010/main" val="1118418764"/>
+        <p14:creationId xmlns="" xmlns:p14="http://schemas.microsoft.com/office/powerpoint/2010/main" val="1118418764"/>
       </p:ext>
     </p:extLst>
   </p:cSld>
@@ -15068,6 +15080,7 @@
           <a:p>
             <a:fld id="{750FFBE5-4B2F-4234-A7E0-04D60560B238}" type="slidenum">
               <a:rPr lang="en-US" smtClean="0"/>
+              <a:pPr/>
               <a:t>9</a:t>
             </a:fld>
             <a:endParaRPr lang="en-US"/>
@@ -15086,7 +15099,7 @@
           <a:blip r:embed="rId2">
             <a:extLst>
               <a:ext uri="{28A0092B-C50C-407E-A947-70E740481C1C}">
-                <a14:useLocalDpi xmlns:a14="http://schemas.microsoft.com/office/drawing/2010/main" val="0"/>
+                <a14:useLocalDpi xmlns="" xmlns:a14="http://schemas.microsoft.com/office/drawing/2010/main" val="0"/>
               </a:ext>
             </a:extLst>
           </a:blip>
@@ -15106,7 +15119,7 @@
           <a:noFill/>
           <a:extLst>
             <a:ext uri="{909E8E84-426E-40DD-AFC4-6F175D3DCCD1}">
-              <a14:hiddenFill xmlns:a14="http://schemas.microsoft.com/office/drawing/2010/main">
+              <a14:hiddenFill xmlns="" xmlns:a14="http://schemas.microsoft.com/office/drawing/2010/main">
                 <a:solidFill>
                   <a:srgbClr val="FFFFFF"/>
                 </a:solidFill>
@@ -15122,7 +15135,7 @@
           <p:nvPr>
             <p:extLst>
               <p:ext uri="{D42A27DB-BD31-4B8C-83A1-F6EECF244321}">
-                <p14:modId xmlns:p14="http://schemas.microsoft.com/office/powerpoint/2010/main" val="2837802598"/>
+                <p14:modId xmlns="" xmlns:p14="http://schemas.microsoft.com/office/powerpoint/2010/main" val="2837802598"/>
               </p:ext>
             </p:extLst>
           </p:nvPr>
@@ -15327,10 +15340,10 @@
           <p:nvPr/>
         </p:nvPicPr>
         <p:blipFill>
-          <a:blip r:embed="rId8">
+          <a:blip r:embed="rId7">
             <a:extLst>
               <a:ext uri="{28A0092B-C50C-407E-A947-70E740481C1C}">
-                <a14:useLocalDpi xmlns:a14="http://schemas.microsoft.com/office/drawing/2010/main" val="0"/>
+                <a14:useLocalDpi xmlns="" xmlns:a14="http://schemas.microsoft.com/office/drawing/2010/main" val="0"/>
               </a:ext>
             </a:extLst>
           </a:blip>
@@ -15350,7 +15363,7 @@
           <a:noFill/>
           <a:extLst>
             <a:ext uri="{909E8E84-426E-40DD-AFC4-6F175D3DCCD1}">
-              <a14:hiddenFill xmlns:a14="http://schemas.microsoft.com/office/drawing/2010/main">
+              <a14:hiddenFill xmlns="" xmlns:a14="http://schemas.microsoft.com/office/drawing/2010/main">
                 <a:solidFill>
                   <a:srgbClr val="FFFFFF"/>
                 </a:solidFill>
@@ -15368,10 +15381,10 @@
           <p:nvPr/>
         </p:nvPicPr>
         <p:blipFill>
-          <a:blip r:embed="rId9">
+          <a:blip r:embed="rId8">
             <a:extLst>
               <a:ext uri="{28A0092B-C50C-407E-A947-70E740481C1C}">
-                <a14:useLocalDpi xmlns:a14="http://schemas.microsoft.com/office/drawing/2010/main" val="0"/>
+                <a14:useLocalDpi xmlns="" xmlns:a14="http://schemas.microsoft.com/office/drawing/2010/main" val="0"/>
               </a:ext>
             </a:extLst>
           </a:blip>
@@ -15391,7 +15404,7 @@
           <a:noFill/>
           <a:extLst>
             <a:ext uri="{909E8E84-426E-40DD-AFC4-6F175D3DCCD1}">
-              <a14:hiddenFill xmlns:a14="http://schemas.microsoft.com/office/drawing/2010/main">
+              <a14:hiddenFill xmlns="" xmlns:a14="http://schemas.microsoft.com/office/drawing/2010/main">
                 <a:solidFill>
                   <a:srgbClr val="FFFFFF"/>
                 </a:solidFill>
@@ -15536,7 +15549,7 @@
     </p:spTree>
     <p:extLst>
       <p:ext uri="{BB962C8B-B14F-4D97-AF65-F5344CB8AC3E}">
-        <p14:creationId xmlns:p14="http://schemas.microsoft.com/office/powerpoint/2010/main" val="4131655772"/>
+        <p14:creationId xmlns="" xmlns:p14="http://schemas.microsoft.com/office/powerpoint/2010/main" val="4131655772"/>
       </p:ext>
     </p:extLst>
   </p:cSld>
@@ -15596,7 +15609,7 @@
     </a:clrScheme>
     <a:fontScheme name="Office">
       <a:majorFont>
-        <a:latin typeface="Calibri Light" panose="020F0302020204030204"/>
+        <a:latin typeface="Calibri Light"/>
         <a:ea typeface=""/>
         <a:cs typeface=""/>
         <a:font script="Jpan" typeface="ＭＳ Ｐゴシック"/>
@@ -15631,7 +15644,7 @@
         <a:font script="Geor" typeface="Sylfaen"/>
       </a:majorFont>
       <a:minorFont>
-        <a:latin typeface="Calibri" panose="020F0502020204030204"/>
+        <a:latin typeface="Calibri"/>
         <a:ea typeface=""/>
         <a:cs typeface=""/>
         <a:font script="Jpan" typeface="ＭＳ Ｐゴシック"/>
@@ -15808,7 +15821,7 @@
   <a:extraClrSchemeLst/>
   <a:extLst>
     <a:ext uri="{05A4C25C-085E-4340-85A3-A5531E510DB2}">
-      <thm15:themeFamily xmlns:thm15="http://schemas.microsoft.com/office/thememl/2012/main" name="Office Theme" id="{62F939B6-93AF-4DB8-9C6B-D6C7DFDC589F}" vid="{4A3C46E8-61CC-4603-A589-7422A47A8E4A}"/>
+      <thm15:themeFamily xmlns="" xmlns:thm15="http://schemas.microsoft.com/office/thememl/2012/main" name="Office Theme" id="{62F939B6-93AF-4DB8-9C6B-D6C7DFDC589F}" vid="{4A3C46E8-61CC-4603-A589-7422A47A8E4A}"/>
     </a:ext>
   </a:extLst>
 </a:theme>
@@ -15857,7 +15870,7 @@
     </a:clrScheme>
     <a:fontScheme name="Office">
       <a:majorFont>
-        <a:latin typeface="Calibri Light" panose="020F0302020204030204"/>
+        <a:latin typeface="Calibri Light"/>
         <a:ea typeface=""/>
         <a:cs typeface=""/>
         <a:font script="Jpan" typeface="ＭＳ Ｐゴシック"/>
@@ -15892,7 +15905,7 @@
         <a:font script="Geor" typeface="Sylfaen"/>
       </a:majorFont>
       <a:minorFont>
-        <a:latin typeface="Calibri" panose="020F0502020204030204"/>
+        <a:latin typeface="Calibri"/>
         <a:ea typeface=""/>
         <a:cs typeface=""/>
         <a:font script="Jpan" typeface="ＭＳ Ｐゴシック"/>
@@ -16069,7 +16082,7 @@
   <a:extraClrSchemeLst/>
   <a:extLst>
     <a:ext uri="{05A4C25C-085E-4340-85A3-A5531E510DB2}">
-      <thm15:themeFamily xmlns:thm15="http://schemas.microsoft.com/office/thememl/2012/main" name="Office Theme" id="{62F939B6-93AF-4DB8-9C6B-D6C7DFDC589F}" vid="{4A3C46E8-61CC-4603-A589-7422A47A8E4A}"/>
+      <thm15:themeFamily xmlns="" xmlns:thm15="http://schemas.microsoft.com/office/thememl/2012/main" name="Office Theme" id="{62F939B6-93AF-4DB8-9C6B-D6C7DFDC589F}" vid="{4A3C46E8-61CC-4603-A589-7422A47A8E4A}"/>
     </a:ext>
   </a:extLst>
 </a:theme>

</xml_diff>